<commit_message>
finish: finish dataset (#13)
</commit_message>
<xml_diff>
--- a/Cases/JS-Real-Time-Market-Data-Forecasting/Imgs/Images.pptx
+++ b/Cases/JS-Real-Time-Market-Data-Forecasting/Imgs/Images.pptx
@@ -6,15 +6,17 @@
   </p:sldMasterIdLst>
   <p:sldIdLst>
     <p:sldId id="257" r:id="rId2"/>
-    <p:sldId id="258" r:id="rId3"/>
-    <p:sldId id="259" r:id="rId4"/>
-    <p:sldId id="260" r:id="rId5"/>
-    <p:sldId id="256" r:id="rId6"/>
-    <p:sldId id="261" r:id="rId7"/>
-    <p:sldId id="262" r:id="rId8"/>
-    <p:sldId id="263" r:id="rId9"/>
-    <p:sldId id="264" r:id="rId10"/>
-    <p:sldId id="265" r:id="rId11"/>
+    <p:sldId id="266" r:id="rId3"/>
+    <p:sldId id="267" r:id="rId4"/>
+    <p:sldId id="258" r:id="rId5"/>
+    <p:sldId id="259" r:id="rId6"/>
+    <p:sldId id="260" r:id="rId7"/>
+    <p:sldId id="256" r:id="rId8"/>
+    <p:sldId id="261" r:id="rId9"/>
+    <p:sldId id="262" r:id="rId10"/>
+    <p:sldId id="263" r:id="rId11"/>
+    <p:sldId id="264" r:id="rId12"/>
+    <p:sldId id="265" r:id="rId13"/>
   </p:sldIdLst>
   <p:sldSz cx="12192000" cy="6858000"/>
   <p:notesSz cx="6858000" cy="9144000"/>
@@ -6898,7 +6900,7 @@
           <a:p>
             <a:fld id="{427AE296-A9A5-184C-949C-5CE65792B61E}" type="datetimeFigureOut">
               <a:rPr lang="en-CN" smtClean="0"/>
-              <a:t>2025/6/4</a:t>
+              <a:t>2025/6/19</a:t>
             </a:fld>
             <a:endParaRPr lang="en-CN"/>
           </a:p>
@@ -7098,7 +7100,7 @@
           <a:p>
             <a:fld id="{427AE296-A9A5-184C-949C-5CE65792B61E}" type="datetimeFigureOut">
               <a:rPr lang="en-CN" smtClean="0"/>
-              <a:t>2025/6/4</a:t>
+              <a:t>2025/6/19</a:t>
             </a:fld>
             <a:endParaRPr lang="en-CN"/>
           </a:p>
@@ -7308,7 +7310,7 @@
           <a:p>
             <a:fld id="{427AE296-A9A5-184C-949C-5CE65792B61E}" type="datetimeFigureOut">
               <a:rPr lang="en-CN" smtClean="0"/>
-              <a:t>2025/6/4</a:t>
+              <a:t>2025/6/19</a:t>
             </a:fld>
             <a:endParaRPr lang="en-CN"/>
           </a:p>
@@ -7508,7 +7510,7 @@
           <a:p>
             <a:fld id="{427AE296-A9A5-184C-949C-5CE65792B61E}" type="datetimeFigureOut">
               <a:rPr lang="en-CN" smtClean="0"/>
-              <a:t>2025/6/4</a:t>
+              <a:t>2025/6/19</a:t>
             </a:fld>
             <a:endParaRPr lang="en-CN"/>
           </a:p>
@@ -7784,7 +7786,7 @@
           <a:p>
             <a:fld id="{427AE296-A9A5-184C-949C-5CE65792B61E}" type="datetimeFigureOut">
               <a:rPr lang="en-CN" smtClean="0"/>
-              <a:t>2025/6/4</a:t>
+              <a:t>2025/6/19</a:t>
             </a:fld>
             <a:endParaRPr lang="en-CN"/>
           </a:p>
@@ -8052,7 +8054,7 @@
           <a:p>
             <a:fld id="{427AE296-A9A5-184C-949C-5CE65792B61E}" type="datetimeFigureOut">
               <a:rPr lang="en-CN" smtClean="0"/>
-              <a:t>2025/6/4</a:t>
+              <a:t>2025/6/19</a:t>
             </a:fld>
             <a:endParaRPr lang="en-CN"/>
           </a:p>
@@ -8467,7 +8469,7 @@
           <a:p>
             <a:fld id="{427AE296-A9A5-184C-949C-5CE65792B61E}" type="datetimeFigureOut">
               <a:rPr lang="en-CN" smtClean="0"/>
-              <a:t>2025/6/4</a:t>
+              <a:t>2025/6/19</a:t>
             </a:fld>
             <a:endParaRPr lang="en-CN"/>
           </a:p>
@@ -8609,7 +8611,7 @@
           <a:p>
             <a:fld id="{427AE296-A9A5-184C-949C-5CE65792B61E}" type="datetimeFigureOut">
               <a:rPr lang="en-CN" smtClean="0"/>
-              <a:t>2025/6/4</a:t>
+              <a:t>2025/6/19</a:t>
             </a:fld>
             <a:endParaRPr lang="en-CN"/>
           </a:p>
@@ -8722,7 +8724,7 @@
           <a:p>
             <a:fld id="{427AE296-A9A5-184C-949C-5CE65792B61E}" type="datetimeFigureOut">
               <a:rPr lang="en-CN" smtClean="0"/>
-              <a:t>2025/6/4</a:t>
+              <a:t>2025/6/19</a:t>
             </a:fld>
             <a:endParaRPr lang="en-CN"/>
           </a:p>
@@ -9035,7 +9037,7 @@
           <a:p>
             <a:fld id="{427AE296-A9A5-184C-949C-5CE65792B61E}" type="datetimeFigureOut">
               <a:rPr lang="en-CN" smtClean="0"/>
-              <a:t>2025/6/4</a:t>
+              <a:t>2025/6/19</a:t>
             </a:fld>
             <a:endParaRPr lang="en-CN"/>
           </a:p>
@@ -9324,7 +9326,7 @@
           <a:p>
             <a:fld id="{427AE296-A9A5-184C-949C-5CE65792B61E}" type="datetimeFigureOut">
               <a:rPr lang="en-CN" smtClean="0"/>
-              <a:t>2025/6/4</a:t>
+              <a:t>2025/6/19</a:t>
             </a:fld>
             <a:endParaRPr lang="en-CN"/>
           </a:p>
@@ -9567,7 +9569,7 @@
           <a:p>
             <a:fld id="{427AE296-A9A5-184C-949C-5CE65792B61E}" type="datetimeFigureOut">
               <a:rPr lang="en-CN" smtClean="0"/>
-              <a:t>2025/6/4</a:t>
+              <a:t>2025/6/19</a:t>
             </a:fld>
             <a:endParaRPr lang="en-CN"/>
           </a:p>
@@ -10962,6 +10964,7 @@
               </a:extLst>
             </p:cNvPr>
             <p:cNvCxnSpPr>
+              <a:cxnSpLocks/>
               <a:stCxn id="11" idx="3"/>
               <a:endCxn id="26" idx="1"/>
             </p:cNvCxnSpPr>
@@ -11727,6 +11730,396 @@
           <a:chExt cx="0" cy="0"/>
         </a:xfrm>
       </p:grpSpPr>
+      <p:pic>
+        <p:nvPicPr>
+          <p:cNvPr id="5" name="Picture 4">
+            <a:extLst>
+              <a:ext uri="{FF2B5EF4-FFF2-40B4-BE49-F238E27FC236}">
+                <a16:creationId xmlns:a16="http://schemas.microsoft.com/office/drawing/2014/main" id="{EE1BC7DA-3408-F540-BE55-5BA7F9E2ACBF}"/>
+              </a:ext>
+            </a:extLst>
+          </p:cNvPr>
+          <p:cNvPicPr>
+            <a:picLocks noChangeAspect="1"/>
+          </p:cNvPicPr>
+          <p:nvPr/>
+        </p:nvPicPr>
+        <p:blipFill>
+          <a:blip r:embed="rId2"/>
+          <a:stretch>
+            <a:fillRect/>
+          </a:stretch>
+        </p:blipFill>
+        <p:spPr>
+          <a:xfrm>
+            <a:off x="6096000" y="2181621"/>
+            <a:ext cx="6096000" cy="2494756"/>
+          </a:xfrm>
+          <a:prstGeom prst="rect">
+            <a:avLst/>
+          </a:prstGeom>
+        </p:spPr>
+      </p:pic>
+      <p:pic>
+        <p:nvPicPr>
+          <p:cNvPr id="7" name="Picture 6">
+            <a:extLst>
+              <a:ext uri="{FF2B5EF4-FFF2-40B4-BE49-F238E27FC236}">
+                <a16:creationId xmlns:a16="http://schemas.microsoft.com/office/drawing/2014/main" id="{01FAD679-C194-974B-946D-436300660CDE}"/>
+              </a:ext>
+            </a:extLst>
+          </p:cNvPr>
+          <p:cNvPicPr>
+            <a:picLocks noChangeAspect="1"/>
+          </p:cNvPicPr>
+          <p:nvPr/>
+        </p:nvPicPr>
+        <p:blipFill>
+          <a:blip r:embed="rId3"/>
+          <a:stretch>
+            <a:fillRect/>
+          </a:stretch>
+        </p:blipFill>
+        <p:spPr>
+          <a:xfrm>
+            <a:off x="0" y="2171313"/>
+            <a:ext cx="6096000" cy="2515373"/>
+          </a:xfrm>
+          <a:prstGeom prst="rect">
+            <a:avLst/>
+          </a:prstGeom>
+        </p:spPr>
+      </p:pic>
+      <p:sp>
+        <p:nvSpPr>
+          <p:cNvPr id="8" name="TextBox 7">
+            <a:extLst>
+              <a:ext uri="{FF2B5EF4-FFF2-40B4-BE49-F238E27FC236}">
+                <a16:creationId xmlns:a16="http://schemas.microsoft.com/office/drawing/2014/main" id="{F40A952E-67FA-434B-B17F-87479D399993}"/>
+              </a:ext>
+            </a:extLst>
+          </p:cNvPr>
+          <p:cNvSpPr txBox="1"/>
+          <p:nvPr/>
+        </p:nvSpPr>
+        <p:spPr>
+          <a:xfrm>
+            <a:off x="8140360" y="4676377"/>
+            <a:ext cx="2007280" cy="369332"/>
+          </a:xfrm>
+          <a:prstGeom prst="rect">
+            <a:avLst/>
+          </a:prstGeom>
+          <a:noFill/>
+        </p:spPr>
+        <p:txBody>
+          <a:bodyPr wrap="none" rtlCol="0">
+            <a:spAutoFit/>
+          </a:bodyPr>
+          <a:lstStyle/>
+          <a:p>
+            <a:pPr algn="ctr"/>
+            <a:r>
+              <a:rPr lang="en-US" b="0" i="0" u="none" strike="noStrike" dirty="0">
+                <a:solidFill>
+                  <a:srgbClr val="333333"/>
+                </a:solidFill>
+                <a:effectLst/>
+                <a:latin typeface="Times New Roman" panose="02020603050405020304" pitchFamily="18" charset="0"/>
+                <a:cs typeface="Times New Roman" panose="02020603050405020304" pitchFamily="18" charset="0"/>
+              </a:rPr>
+              <a:t>BS Change (bs*=2)</a:t>
+            </a:r>
+            <a:endParaRPr lang="en-CN" dirty="0">
+              <a:latin typeface="Times New Roman" panose="02020603050405020304" pitchFamily="18" charset="0"/>
+              <a:cs typeface="Times New Roman" panose="02020603050405020304" pitchFamily="18" charset="0"/>
+            </a:endParaRPr>
+          </a:p>
+        </p:txBody>
+      </p:sp>
+      <p:sp>
+        <p:nvSpPr>
+          <p:cNvPr id="9" name="TextBox 8">
+            <a:extLst>
+              <a:ext uri="{FF2B5EF4-FFF2-40B4-BE49-F238E27FC236}">
+                <a16:creationId xmlns:a16="http://schemas.microsoft.com/office/drawing/2014/main" id="{DAE8755A-FA1F-B448-82C2-8B18378FC4CD}"/>
+              </a:ext>
+            </a:extLst>
+          </p:cNvPr>
+          <p:cNvSpPr txBox="1"/>
+          <p:nvPr/>
+        </p:nvSpPr>
+        <p:spPr>
+          <a:xfrm>
+            <a:off x="2070007" y="4676377"/>
+            <a:ext cx="1955985" cy="369332"/>
+          </a:xfrm>
+          <a:prstGeom prst="rect">
+            <a:avLst/>
+          </a:prstGeom>
+          <a:noFill/>
+        </p:spPr>
+        <p:txBody>
+          <a:bodyPr wrap="none" rtlCol="0">
+            <a:spAutoFit/>
+          </a:bodyPr>
+          <a:lstStyle/>
+          <a:p>
+            <a:pPr algn="ctr"/>
+            <a:r>
+              <a:rPr lang="en-US" b="0" i="0" u="none" strike="noStrike" dirty="0">
+                <a:solidFill>
+                  <a:srgbClr val="333333"/>
+                </a:solidFill>
+                <a:effectLst/>
+                <a:latin typeface="Times New Roman" panose="02020603050405020304" pitchFamily="18" charset="0"/>
+                <a:cs typeface="Times New Roman" panose="02020603050405020304" pitchFamily="18" charset="0"/>
+              </a:rPr>
+              <a:t>BS Change (bs</a:t>
+            </a:r>
+            <a:r>
+              <a:rPr lang="en-US" altLang="zh-CN" b="0" i="0" u="none" strike="noStrike" dirty="0">
+                <a:solidFill>
+                  <a:srgbClr val="333333"/>
+                </a:solidFill>
+                <a:effectLst/>
+                <a:latin typeface="Times New Roman" panose="02020603050405020304" pitchFamily="18" charset="0"/>
+                <a:cs typeface="Times New Roman" panose="02020603050405020304" pitchFamily="18" charset="0"/>
+              </a:rPr>
+              <a:t>/</a:t>
+            </a:r>
+            <a:r>
+              <a:rPr lang="en-US" b="0" i="0" u="none" strike="noStrike" dirty="0">
+                <a:solidFill>
+                  <a:srgbClr val="333333"/>
+                </a:solidFill>
+                <a:effectLst/>
+                <a:latin typeface="Times New Roman" panose="02020603050405020304" pitchFamily="18" charset="0"/>
+                <a:cs typeface="Times New Roman" panose="02020603050405020304" pitchFamily="18" charset="0"/>
+              </a:rPr>
+              <a:t>=2)</a:t>
+            </a:r>
+            <a:endParaRPr lang="en-CN" dirty="0">
+              <a:latin typeface="Times New Roman" panose="02020603050405020304" pitchFamily="18" charset="0"/>
+              <a:cs typeface="Times New Roman" panose="02020603050405020304" pitchFamily="18" charset="0"/>
+            </a:endParaRPr>
+          </a:p>
+        </p:txBody>
+      </p:sp>
+    </p:spTree>
+    <p:extLst>
+      <p:ext uri="{BB962C8B-B14F-4D97-AF65-F5344CB8AC3E}">
+        <p14:creationId xmlns:p14="http://schemas.microsoft.com/office/powerpoint/2010/main" val="423340629"/>
+      </p:ext>
+    </p:extLst>
+  </p:cSld>
+  <p:clrMapOvr>
+    <a:masterClrMapping/>
+  </p:clrMapOvr>
+</p:sld>
+</file>
+
+<file path=ppt/slides/slide11.xml><?xml version="1.0" encoding="utf-8"?>
+<p:sld xmlns:a="http://schemas.openxmlformats.org/drawingml/2006/main" xmlns:r="http://schemas.openxmlformats.org/officeDocument/2006/relationships" xmlns:p="http://schemas.openxmlformats.org/presentationml/2006/main">
+  <p:cSld>
+    <p:spTree>
+      <p:nvGrpSpPr>
+        <p:cNvPr id="1" name=""/>
+        <p:cNvGrpSpPr/>
+        <p:nvPr/>
+      </p:nvGrpSpPr>
+      <p:grpSpPr>
+        <a:xfrm>
+          <a:off x="0" y="0"/>
+          <a:ext cx="0" cy="0"/>
+          <a:chOff x="0" y="0"/>
+          <a:chExt cx="0" cy="0"/>
+        </a:xfrm>
+      </p:grpSpPr>
+      <p:pic>
+        <p:nvPicPr>
+          <p:cNvPr id="7" name="Picture 6">
+            <a:extLst>
+              <a:ext uri="{FF2B5EF4-FFF2-40B4-BE49-F238E27FC236}">
+                <a16:creationId xmlns:a16="http://schemas.microsoft.com/office/drawing/2014/main" id="{5B034E5C-B39E-4D48-BDC7-23F56B6A0F78}"/>
+              </a:ext>
+            </a:extLst>
+          </p:cNvPr>
+          <p:cNvPicPr>
+            <a:picLocks noChangeAspect="1"/>
+          </p:cNvPicPr>
+          <p:nvPr/>
+        </p:nvPicPr>
+        <p:blipFill>
+          <a:blip r:embed="rId2"/>
+          <a:stretch>
+            <a:fillRect/>
+          </a:stretch>
+        </p:blipFill>
+        <p:spPr>
+          <a:xfrm>
+            <a:off x="0" y="2181622"/>
+            <a:ext cx="6095999" cy="2494755"/>
+          </a:xfrm>
+          <a:prstGeom prst="rect">
+            <a:avLst/>
+          </a:prstGeom>
+        </p:spPr>
+      </p:pic>
+      <p:pic>
+        <p:nvPicPr>
+          <p:cNvPr id="9" name="Picture 8">
+            <a:extLst>
+              <a:ext uri="{FF2B5EF4-FFF2-40B4-BE49-F238E27FC236}">
+                <a16:creationId xmlns:a16="http://schemas.microsoft.com/office/drawing/2014/main" id="{E8E65419-4D5D-4A4F-A140-33EDDAC866B8}"/>
+              </a:ext>
+            </a:extLst>
+          </p:cNvPr>
+          <p:cNvPicPr>
+            <a:picLocks noChangeAspect="1"/>
+          </p:cNvPicPr>
+          <p:nvPr/>
+        </p:nvPicPr>
+        <p:blipFill>
+          <a:blip r:embed="rId3"/>
+          <a:stretch>
+            <a:fillRect/>
+          </a:stretch>
+        </p:blipFill>
+        <p:spPr>
+          <a:xfrm>
+            <a:off x="6095999" y="2181622"/>
+            <a:ext cx="6096000" cy="2494755"/>
+          </a:xfrm>
+          <a:prstGeom prst="rect">
+            <a:avLst/>
+          </a:prstGeom>
+        </p:spPr>
+      </p:pic>
+      <p:sp>
+        <p:nvSpPr>
+          <p:cNvPr id="10" name="TextBox 9">
+            <a:extLst>
+              <a:ext uri="{FF2B5EF4-FFF2-40B4-BE49-F238E27FC236}">
+                <a16:creationId xmlns:a16="http://schemas.microsoft.com/office/drawing/2014/main" id="{F9DB54DF-9A63-214D-96D9-A605D3D22CC2}"/>
+              </a:ext>
+            </a:extLst>
+          </p:cNvPr>
+          <p:cNvSpPr txBox="1"/>
+          <p:nvPr/>
+        </p:nvSpPr>
+        <p:spPr>
+          <a:xfrm>
+            <a:off x="7907121" y="4676377"/>
+            <a:ext cx="2473755" cy="369332"/>
+          </a:xfrm>
+          <a:prstGeom prst="rect">
+            <a:avLst/>
+          </a:prstGeom>
+          <a:noFill/>
+        </p:spPr>
+        <p:txBody>
+          <a:bodyPr wrap="none" rtlCol="0">
+            <a:spAutoFit/>
+          </a:bodyPr>
+          <a:lstStyle/>
+          <a:p>
+            <a:pPr algn="ctr"/>
+            <a:r>
+              <a:rPr lang="en-US" b="0" i="0" u="none" strike="noStrike" dirty="0">
+                <a:solidFill>
+                  <a:srgbClr val="333333"/>
+                </a:solidFill>
+                <a:effectLst/>
+                <a:latin typeface="Times New Roman" panose="02020603050405020304" pitchFamily="18" charset="0"/>
+                <a:cs typeface="Times New Roman" panose="02020603050405020304" pitchFamily="18" charset="0"/>
+              </a:rPr>
+              <a:t>Conv Change (both 5x5)</a:t>
+            </a:r>
+            <a:endParaRPr lang="en-CN" dirty="0">
+              <a:latin typeface="Times New Roman" panose="02020603050405020304" pitchFamily="18" charset="0"/>
+              <a:cs typeface="Times New Roman" panose="02020603050405020304" pitchFamily="18" charset="0"/>
+            </a:endParaRPr>
+          </a:p>
+        </p:txBody>
+      </p:sp>
+      <p:sp>
+        <p:nvSpPr>
+          <p:cNvPr id="11" name="TextBox 10">
+            <a:extLst>
+              <a:ext uri="{FF2B5EF4-FFF2-40B4-BE49-F238E27FC236}">
+                <a16:creationId xmlns:a16="http://schemas.microsoft.com/office/drawing/2014/main" id="{8C4A2E3D-935B-F345-A612-645B7F1F31E7}"/>
+              </a:ext>
+            </a:extLst>
+          </p:cNvPr>
+          <p:cNvSpPr txBox="1"/>
+          <p:nvPr/>
+        </p:nvSpPr>
+        <p:spPr>
+          <a:xfrm>
+            <a:off x="1811123" y="4676377"/>
+            <a:ext cx="2473754" cy="369332"/>
+          </a:xfrm>
+          <a:prstGeom prst="rect">
+            <a:avLst/>
+          </a:prstGeom>
+          <a:noFill/>
+        </p:spPr>
+        <p:txBody>
+          <a:bodyPr wrap="none" rtlCol="0">
+            <a:spAutoFit/>
+          </a:bodyPr>
+          <a:lstStyle/>
+          <a:p>
+            <a:pPr algn="ctr"/>
+            <a:r>
+              <a:rPr lang="en-US" b="0" i="0" u="none" strike="noStrike" dirty="0">
+                <a:solidFill>
+                  <a:srgbClr val="333333"/>
+                </a:solidFill>
+                <a:effectLst/>
+                <a:latin typeface="Times New Roman" panose="02020603050405020304" pitchFamily="18" charset="0"/>
+                <a:cs typeface="Times New Roman" panose="02020603050405020304" pitchFamily="18" charset="0"/>
+              </a:rPr>
+              <a:t>Conv Change (both 3x3)</a:t>
+            </a:r>
+            <a:endParaRPr lang="en-CN" dirty="0">
+              <a:latin typeface="Times New Roman" panose="02020603050405020304" pitchFamily="18" charset="0"/>
+              <a:cs typeface="Times New Roman" panose="02020603050405020304" pitchFamily="18" charset="0"/>
+            </a:endParaRPr>
+          </a:p>
+        </p:txBody>
+      </p:sp>
+    </p:spTree>
+    <p:extLst>
+      <p:ext uri="{BB962C8B-B14F-4D97-AF65-F5344CB8AC3E}">
+        <p14:creationId xmlns:p14="http://schemas.microsoft.com/office/powerpoint/2010/main" val="3334265441"/>
+      </p:ext>
+    </p:extLst>
+  </p:cSld>
+  <p:clrMapOvr>
+    <a:masterClrMapping/>
+  </p:clrMapOvr>
+</p:sld>
+</file>
+
+<file path=ppt/slides/slide12.xml><?xml version="1.0" encoding="utf-8"?>
+<p:sld xmlns:a="http://schemas.openxmlformats.org/drawingml/2006/main" xmlns:r="http://schemas.openxmlformats.org/officeDocument/2006/relationships" xmlns:p="http://schemas.openxmlformats.org/presentationml/2006/main">
+  <p:cSld>
+    <p:spTree>
+      <p:nvGrpSpPr>
+        <p:cNvPr id="1" name=""/>
+        <p:cNvGrpSpPr/>
+        <p:nvPr/>
+      </p:nvGrpSpPr>
+      <p:grpSpPr>
+        <a:xfrm>
+          <a:off x="0" y="0"/>
+          <a:ext cx="0" cy="0"/>
+          <a:chOff x="0" y="0"/>
+          <a:chExt cx="0" cy="0"/>
+        </a:xfrm>
+      </p:grpSpPr>
       <p:grpSp>
         <p:nvGrpSpPr>
           <p:cNvPr id="7" name="Group 6">
@@ -11836,6 +12229,1627 @@
 </file>
 
 <file path=ppt/slides/slide2.xml><?xml version="1.0" encoding="utf-8"?>
+<p:sld xmlns:a="http://schemas.openxmlformats.org/drawingml/2006/main" xmlns:r="http://schemas.openxmlformats.org/officeDocument/2006/relationships" xmlns:p="http://schemas.openxmlformats.org/presentationml/2006/main">
+  <p:cSld>
+    <p:spTree>
+      <p:nvGrpSpPr>
+        <p:cNvPr id="1" name=""/>
+        <p:cNvGrpSpPr/>
+        <p:nvPr/>
+      </p:nvGrpSpPr>
+      <p:grpSpPr>
+        <a:xfrm>
+          <a:off x="0" y="0"/>
+          <a:ext cx="0" cy="0"/>
+          <a:chOff x="0" y="0"/>
+          <a:chExt cx="0" cy="0"/>
+        </a:xfrm>
+      </p:grpSpPr>
+      <p:grpSp>
+        <p:nvGrpSpPr>
+          <p:cNvPr id="38" name="Group 37">
+            <a:extLst>
+              <a:ext uri="{FF2B5EF4-FFF2-40B4-BE49-F238E27FC236}">
+                <a16:creationId xmlns:a16="http://schemas.microsoft.com/office/drawing/2014/main" id="{0914222F-F9DD-A747-BB29-5C4EE66D1479}"/>
+              </a:ext>
+            </a:extLst>
+          </p:cNvPr>
+          <p:cNvGrpSpPr/>
+          <p:nvPr/>
+        </p:nvGrpSpPr>
+        <p:grpSpPr>
+          <a:xfrm>
+            <a:off x="1242627" y="1474293"/>
+            <a:ext cx="9962345" cy="3906194"/>
+            <a:chOff x="1242627" y="1474293"/>
+            <a:chExt cx="9962345" cy="3906194"/>
+          </a:xfrm>
+        </p:grpSpPr>
+        <p:grpSp>
+          <p:nvGrpSpPr>
+            <p:cNvPr id="5" name="Group 4">
+              <a:extLst>
+                <a:ext uri="{FF2B5EF4-FFF2-40B4-BE49-F238E27FC236}">
+                  <a16:creationId xmlns:a16="http://schemas.microsoft.com/office/drawing/2014/main" id="{4B39748A-7CF8-0E4D-867A-328AE8E802ED}"/>
+                </a:ext>
+              </a:extLst>
+            </p:cNvPr>
+            <p:cNvGrpSpPr/>
+            <p:nvPr/>
+          </p:nvGrpSpPr>
+          <p:grpSpPr>
+            <a:xfrm>
+              <a:off x="1242627" y="1791998"/>
+              <a:ext cx="2573079" cy="3588489"/>
+              <a:chOff x="1242627" y="1791998"/>
+              <a:chExt cx="2573079" cy="3588489"/>
+            </a:xfrm>
+          </p:grpSpPr>
+          <p:sp>
+            <p:nvSpPr>
+              <p:cNvPr id="27" name="Rounded Rectangle 26">
+                <a:extLst>
+                  <a:ext uri="{FF2B5EF4-FFF2-40B4-BE49-F238E27FC236}">
+                    <a16:creationId xmlns:a16="http://schemas.microsoft.com/office/drawing/2014/main" id="{B1087974-1327-744F-98D8-37E650C81245}"/>
+                  </a:ext>
+                </a:extLst>
+              </p:cNvPr>
+              <p:cNvSpPr/>
+              <p:nvPr/>
+            </p:nvSpPr>
+            <p:spPr>
+              <a:xfrm>
+                <a:off x="1242627" y="1791999"/>
+                <a:ext cx="2573079" cy="3588488"/>
+              </a:xfrm>
+              <a:prstGeom prst="roundRect">
+                <a:avLst>
+                  <a:gd name="adj" fmla="val 2024"/>
+                </a:avLst>
+              </a:prstGeom>
+              <a:solidFill>
+                <a:schemeClr val="accent6">
+                  <a:lumMod val="20000"/>
+                  <a:lumOff val="80000"/>
+                </a:schemeClr>
+              </a:solidFill>
+              <a:ln w="12700">
+                <a:solidFill>
+                  <a:schemeClr val="tx1"/>
+                </a:solidFill>
+              </a:ln>
+            </p:spPr>
+            <p:style>
+              <a:lnRef idx="2">
+                <a:schemeClr val="accent1">
+                  <a:shade val="50000"/>
+                </a:schemeClr>
+              </a:lnRef>
+              <a:fillRef idx="1">
+                <a:schemeClr val="accent1"/>
+              </a:fillRef>
+              <a:effectRef idx="0">
+                <a:schemeClr val="accent1"/>
+              </a:effectRef>
+              <a:fontRef idx="minor">
+                <a:schemeClr val="lt1"/>
+              </a:fontRef>
+            </p:style>
+            <p:txBody>
+              <a:bodyPr rtlCol="0" anchor="ctr"/>
+              <a:lstStyle/>
+              <a:p>
+                <a:pPr algn="ctr"/>
+                <a:endParaRPr lang="en-CN" dirty="0"/>
+              </a:p>
+            </p:txBody>
+          </p:sp>
+          <p:sp>
+            <p:nvSpPr>
+              <p:cNvPr id="28" name="TextBox 27">
+                <a:extLst>
+                  <a:ext uri="{FF2B5EF4-FFF2-40B4-BE49-F238E27FC236}">
+                    <a16:creationId xmlns:a16="http://schemas.microsoft.com/office/drawing/2014/main" id="{30D542CC-68C7-EB43-980F-6E0AD9123C47}"/>
+                  </a:ext>
+                </a:extLst>
+              </p:cNvPr>
+              <p:cNvSpPr txBox="1"/>
+              <p:nvPr/>
+            </p:nvSpPr>
+            <p:spPr>
+              <a:xfrm>
+                <a:off x="1242627" y="1791998"/>
+                <a:ext cx="2573079" cy="400110"/>
+              </a:xfrm>
+              <a:prstGeom prst="rect">
+                <a:avLst/>
+              </a:prstGeom>
+              <a:noFill/>
+            </p:spPr>
+            <p:txBody>
+              <a:bodyPr wrap="square" rtlCol="0" anchor="ctr">
+                <a:spAutoFit/>
+              </a:bodyPr>
+              <a:lstStyle/>
+              <a:p>
+                <a:pPr algn="ctr"/>
+                <a:r>
+                  <a:rPr lang="en-US" altLang="zh-CN" sz="2000" b="1" dirty="0">
+                    <a:latin typeface="Times New Roman" panose="02020603050405020304" pitchFamily="18" charset="0"/>
+                    <a:cs typeface="Times New Roman" panose="02020603050405020304" pitchFamily="18" charset="0"/>
+                  </a:rPr>
+                  <a:t>1.</a:t>
+                </a:r>
+                <a:r>
+                  <a:rPr lang="zh-CN" altLang="en-US" sz="2000" b="1" dirty="0">
+                    <a:latin typeface="Times New Roman" panose="02020603050405020304" pitchFamily="18" charset="0"/>
+                    <a:cs typeface="Times New Roman" panose="02020603050405020304" pitchFamily="18" charset="0"/>
+                  </a:rPr>
+                  <a:t> </a:t>
+                </a:r>
+                <a:r>
+                  <a:rPr lang="en-CN" sz="2000" b="1" dirty="0">
+                    <a:latin typeface="Times New Roman" panose="02020603050405020304" pitchFamily="18" charset="0"/>
+                    <a:cs typeface="Times New Roman" panose="02020603050405020304" pitchFamily="18" charset="0"/>
+                  </a:rPr>
+                  <a:t>Dataset</a:t>
+                </a:r>
+              </a:p>
+            </p:txBody>
+          </p:sp>
+          <p:grpSp>
+            <p:nvGrpSpPr>
+              <p:cNvPr id="29" name="Group 28">
+                <a:extLst>
+                  <a:ext uri="{FF2B5EF4-FFF2-40B4-BE49-F238E27FC236}">
+                    <a16:creationId xmlns:a16="http://schemas.microsoft.com/office/drawing/2014/main" id="{9FE5B59C-DC93-8745-BDC9-BC8B5DDCB454}"/>
+                  </a:ext>
+                </a:extLst>
+              </p:cNvPr>
+              <p:cNvGrpSpPr/>
+              <p:nvPr/>
+            </p:nvGrpSpPr>
+            <p:grpSpPr>
+              <a:xfrm>
+                <a:off x="1370217" y="2492797"/>
+                <a:ext cx="2317897" cy="2587001"/>
+                <a:chOff x="1084518" y="1256664"/>
+                <a:chExt cx="2317897" cy="2587001"/>
+              </a:xfrm>
+            </p:grpSpPr>
+            <p:sp>
+              <p:nvSpPr>
+                <p:cNvPr id="30" name="Rounded Rectangle 29">
+                  <a:extLst>
+                    <a:ext uri="{FF2B5EF4-FFF2-40B4-BE49-F238E27FC236}">
+                      <a16:creationId xmlns:a16="http://schemas.microsoft.com/office/drawing/2014/main" id="{B725F9CE-A152-0D46-85C9-5133D0F4074A}"/>
+                    </a:ext>
+                  </a:extLst>
+                </p:cNvPr>
+                <p:cNvSpPr/>
+                <p:nvPr/>
+              </p:nvSpPr>
+              <p:spPr>
+                <a:xfrm>
+                  <a:off x="1084518" y="1256664"/>
+                  <a:ext cx="2317897" cy="606056"/>
+                </a:xfrm>
+                <a:prstGeom prst="roundRect">
+                  <a:avLst/>
+                </a:prstGeom>
+                <a:solidFill>
+                  <a:schemeClr val="accent6">
+                    <a:lumMod val="40000"/>
+                    <a:lumOff val="60000"/>
+                  </a:schemeClr>
+                </a:solidFill>
+                <a:ln w="12700">
+                  <a:solidFill>
+                    <a:schemeClr val="accent6">
+                      <a:lumMod val="50000"/>
+                    </a:schemeClr>
+                  </a:solidFill>
+                </a:ln>
+              </p:spPr>
+              <p:style>
+                <a:lnRef idx="2">
+                  <a:schemeClr val="accent1">
+                    <a:shade val="50000"/>
+                  </a:schemeClr>
+                </a:lnRef>
+                <a:fillRef idx="1">
+                  <a:schemeClr val="accent1"/>
+                </a:fillRef>
+                <a:effectRef idx="0">
+                  <a:schemeClr val="accent1"/>
+                </a:effectRef>
+                <a:fontRef idx="minor">
+                  <a:schemeClr val="lt1"/>
+                </a:fontRef>
+              </p:style>
+              <p:txBody>
+                <a:bodyPr rtlCol="0" anchor="ctr"/>
+                <a:lstStyle/>
+                <a:p>
+                  <a:pPr algn="ctr"/>
+                  <a:r>
+                    <a:rPr lang="en-CN" sz="1600" dirty="0">
+                      <a:solidFill>
+                        <a:schemeClr val="tx1"/>
+                      </a:solidFill>
+                      <a:latin typeface="Times New Roman" panose="02020603050405020304" pitchFamily="18" charset="0"/>
+                      <a:cs typeface="Times New Roman" panose="02020603050405020304" pitchFamily="18" charset="0"/>
+                    </a:rPr>
+                    <a:t>Download Raw Dataset</a:t>
+                  </a:r>
+                </a:p>
+                <a:p>
+                  <a:pPr algn="ctr"/>
+                  <a:r>
+                    <a:rPr lang="en-CN" sz="1600" dirty="0">
+                      <a:solidFill>
+                        <a:schemeClr val="tx1"/>
+                      </a:solidFill>
+                      <a:latin typeface="Times New Roman" panose="02020603050405020304" pitchFamily="18" charset="0"/>
+                      <a:cs typeface="Times New Roman" panose="02020603050405020304" pitchFamily="18" charset="0"/>
+                    </a:rPr>
+                    <a:t>From Website</a:t>
+                  </a:r>
+                </a:p>
+              </p:txBody>
+            </p:sp>
+            <p:sp>
+              <p:nvSpPr>
+                <p:cNvPr id="31" name="Rounded Rectangle 30">
+                  <a:extLst>
+                    <a:ext uri="{FF2B5EF4-FFF2-40B4-BE49-F238E27FC236}">
+                      <a16:creationId xmlns:a16="http://schemas.microsoft.com/office/drawing/2014/main" id="{5B34A59A-576A-AF44-96ED-EF7B23D0FF96}"/>
+                    </a:ext>
+                  </a:extLst>
+                </p:cNvPr>
+                <p:cNvSpPr/>
+                <p:nvPr/>
+              </p:nvSpPr>
+              <p:spPr>
+                <a:xfrm>
+                  <a:off x="1084518" y="2246125"/>
+                  <a:ext cx="2317897" cy="606056"/>
+                </a:xfrm>
+                <a:prstGeom prst="roundRect">
+                  <a:avLst/>
+                </a:prstGeom>
+                <a:solidFill>
+                  <a:schemeClr val="accent6">
+                    <a:lumMod val="40000"/>
+                    <a:lumOff val="60000"/>
+                  </a:schemeClr>
+                </a:solidFill>
+                <a:ln w="12700">
+                  <a:solidFill>
+                    <a:schemeClr val="accent6">
+                      <a:lumMod val="50000"/>
+                    </a:schemeClr>
+                  </a:solidFill>
+                </a:ln>
+              </p:spPr>
+              <p:style>
+                <a:lnRef idx="2">
+                  <a:schemeClr val="accent1">
+                    <a:shade val="50000"/>
+                  </a:schemeClr>
+                </a:lnRef>
+                <a:fillRef idx="1">
+                  <a:schemeClr val="accent1"/>
+                </a:fillRef>
+                <a:effectRef idx="0">
+                  <a:schemeClr val="accent1"/>
+                </a:effectRef>
+                <a:fontRef idx="minor">
+                  <a:schemeClr val="lt1"/>
+                </a:fontRef>
+              </p:style>
+              <p:txBody>
+                <a:bodyPr rtlCol="0" anchor="ctr"/>
+                <a:lstStyle/>
+                <a:p>
+                  <a:pPr algn="ctr"/>
+                  <a:r>
+                    <a:rPr lang="en-CN" sz="1600" dirty="0">
+                      <a:solidFill>
+                        <a:schemeClr val="tx1"/>
+                      </a:solidFill>
+                      <a:latin typeface="Times New Roman" panose="02020603050405020304" pitchFamily="18" charset="0"/>
+                      <a:cs typeface="Times New Roman" panose="02020603050405020304" pitchFamily="18" charset="0"/>
+                    </a:rPr>
+                    <a:t>Data Preprocess</a:t>
+                  </a:r>
+                </a:p>
+              </p:txBody>
+            </p:sp>
+            <p:cxnSp>
+              <p:nvCxnSpPr>
+                <p:cNvPr id="32" name="Straight Arrow Connector 31">
+                  <a:extLst>
+                    <a:ext uri="{FF2B5EF4-FFF2-40B4-BE49-F238E27FC236}">
+                      <a16:creationId xmlns:a16="http://schemas.microsoft.com/office/drawing/2014/main" id="{F0F7271E-904E-6B4E-9C19-5D175517E171}"/>
+                    </a:ext>
+                  </a:extLst>
+                </p:cNvPr>
+                <p:cNvCxnSpPr>
+                  <a:stCxn id="30" idx="2"/>
+                  <a:endCxn id="31" idx="0"/>
+                </p:cNvCxnSpPr>
+                <p:nvPr/>
+              </p:nvCxnSpPr>
+              <p:spPr>
+                <a:xfrm>
+                  <a:off x="2243467" y="1862720"/>
+                  <a:ext cx="0" cy="383405"/>
+                </a:xfrm>
+                <a:prstGeom prst="straightConnector1">
+                  <a:avLst/>
+                </a:prstGeom>
+                <a:ln w="12700">
+                  <a:solidFill>
+                    <a:schemeClr val="tx1"/>
+                  </a:solidFill>
+                  <a:tailEnd type="stealth" w="lg" len="lg"/>
+                </a:ln>
+              </p:spPr>
+              <p:style>
+                <a:lnRef idx="1">
+                  <a:schemeClr val="accent1"/>
+                </a:lnRef>
+                <a:fillRef idx="0">
+                  <a:schemeClr val="accent1"/>
+                </a:fillRef>
+                <a:effectRef idx="0">
+                  <a:schemeClr val="accent1"/>
+                </a:effectRef>
+                <a:fontRef idx="minor">
+                  <a:schemeClr val="tx1"/>
+                </a:fontRef>
+              </p:style>
+            </p:cxnSp>
+            <p:sp>
+              <p:nvSpPr>
+                <p:cNvPr id="33" name="Rounded Rectangle 32">
+                  <a:extLst>
+                    <a:ext uri="{FF2B5EF4-FFF2-40B4-BE49-F238E27FC236}">
+                      <a16:creationId xmlns:a16="http://schemas.microsoft.com/office/drawing/2014/main" id="{AEE91A18-2F99-2845-A701-36F4DDF42150}"/>
+                    </a:ext>
+                  </a:extLst>
+                </p:cNvPr>
+                <p:cNvSpPr/>
+                <p:nvPr/>
+              </p:nvSpPr>
+              <p:spPr>
+                <a:xfrm>
+                  <a:off x="1084518" y="3237609"/>
+                  <a:ext cx="2317897" cy="606056"/>
+                </a:xfrm>
+                <a:prstGeom prst="roundRect">
+                  <a:avLst/>
+                </a:prstGeom>
+                <a:solidFill>
+                  <a:schemeClr val="accent6">
+                    <a:lumMod val="40000"/>
+                    <a:lumOff val="60000"/>
+                  </a:schemeClr>
+                </a:solidFill>
+                <a:ln w="12700">
+                  <a:solidFill>
+                    <a:schemeClr val="accent6">
+                      <a:lumMod val="50000"/>
+                    </a:schemeClr>
+                  </a:solidFill>
+                </a:ln>
+              </p:spPr>
+              <p:style>
+                <a:lnRef idx="2">
+                  <a:schemeClr val="accent1">
+                    <a:shade val="50000"/>
+                  </a:schemeClr>
+                </a:lnRef>
+                <a:fillRef idx="1">
+                  <a:schemeClr val="accent1"/>
+                </a:fillRef>
+                <a:effectRef idx="0">
+                  <a:schemeClr val="accent1"/>
+                </a:effectRef>
+                <a:fontRef idx="minor">
+                  <a:schemeClr val="lt1"/>
+                </a:fontRef>
+              </p:style>
+              <p:txBody>
+                <a:bodyPr rtlCol="0" anchor="ctr"/>
+                <a:lstStyle/>
+                <a:p>
+                  <a:pPr algn="ctr"/>
+                  <a:r>
+                    <a:rPr lang="en-CN" sz="1600" dirty="0">
+                      <a:solidFill>
+                        <a:schemeClr val="tx1"/>
+                      </a:solidFill>
+                      <a:latin typeface="Times New Roman" panose="02020603050405020304" pitchFamily="18" charset="0"/>
+                      <a:cs typeface="Times New Roman" panose="02020603050405020304" pitchFamily="18" charset="0"/>
+                    </a:rPr>
+                    <a:t>Well-Orgnized</a:t>
+                  </a:r>
+                </a:p>
+                <a:p>
+                  <a:pPr algn="ctr"/>
+                  <a:r>
+                    <a:rPr lang="en-CN" sz="1600" dirty="0">
+                      <a:solidFill>
+                        <a:schemeClr val="tx1"/>
+                      </a:solidFill>
+                      <a:latin typeface="Times New Roman" panose="02020603050405020304" pitchFamily="18" charset="0"/>
+                      <a:cs typeface="Times New Roman" panose="02020603050405020304" pitchFamily="18" charset="0"/>
+                    </a:rPr>
+                    <a:t>Dataset</a:t>
+                  </a:r>
+                </a:p>
+              </p:txBody>
+            </p:sp>
+            <p:cxnSp>
+              <p:nvCxnSpPr>
+                <p:cNvPr id="34" name="Straight Arrow Connector 33">
+                  <a:extLst>
+                    <a:ext uri="{FF2B5EF4-FFF2-40B4-BE49-F238E27FC236}">
+                      <a16:creationId xmlns:a16="http://schemas.microsoft.com/office/drawing/2014/main" id="{422101A6-F239-0C4B-BD41-AB580F6CCF4B}"/>
+                    </a:ext>
+                  </a:extLst>
+                </p:cNvPr>
+                <p:cNvCxnSpPr>
+                  <a:cxnSpLocks/>
+                  <a:stCxn id="31" idx="2"/>
+                  <a:endCxn id="33" idx="0"/>
+                </p:cNvCxnSpPr>
+                <p:nvPr/>
+              </p:nvCxnSpPr>
+              <p:spPr>
+                <a:xfrm>
+                  <a:off x="2243467" y="2852181"/>
+                  <a:ext cx="0" cy="385428"/>
+                </a:xfrm>
+                <a:prstGeom prst="straightConnector1">
+                  <a:avLst/>
+                </a:prstGeom>
+                <a:ln w="12700">
+                  <a:solidFill>
+                    <a:schemeClr val="tx1"/>
+                  </a:solidFill>
+                  <a:tailEnd type="stealth" w="lg" len="lg"/>
+                </a:ln>
+              </p:spPr>
+              <p:style>
+                <a:lnRef idx="1">
+                  <a:schemeClr val="accent1"/>
+                </a:lnRef>
+                <a:fillRef idx="0">
+                  <a:schemeClr val="accent1"/>
+                </a:fillRef>
+                <a:effectRef idx="0">
+                  <a:schemeClr val="accent1"/>
+                </a:effectRef>
+                <a:fontRef idx="minor">
+                  <a:schemeClr val="tx1"/>
+                </a:fontRef>
+              </p:style>
+            </p:cxnSp>
+          </p:grpSp>
+        </p:grpSp>
+        <p:grpSp>
+          <p:nvGrpSpPr>
+            <p:cNvPr id="6" name="Group 5">
+              <a:extLst>
+                <a:ext uri="{FF2B5EF4-FFF2-40B4-BE49-F238E27FC236}">
+                  <a16:creationId xmlns:a16="http://schemas.microsoft.com/office/drawing/2014/main" id="{D3B63A47-60BD-3649-8095-01569424C113}"/>
+                </a:ext>
+              </a:extLst>
+            </p:cNvPr>
+            <p:cNvGrpSpPr/>
+            <p:nvPr/>
+          </p:nvGrpSpPr>
+          <p:grpSpPr>
+            <a:xfrm>
+              <a:off x="4809460" y="1791349"/>
+              <a:ext cx="2573079" cy="3588489"/>
+              <a:chOff x="4652867" y="1791349"/>
+              <a:chExt cx="2573079" cy="3588489"/>
+            </a:xfrm>
+          </p:grpSpPr>
+          <p:sp>
+            <p:nvSpPr>
+              <p:cNvPr id="20" name="Rounded Rectangle 19">
+                <a:extLst>
+                  <a:ext uri="{FF2B5EF4-FFF2-40B4-BE49-F238E27FC236}">
+                    <a16:creationId xmlns:a16="http://schemas.microsoft.com/office/drawing/2014/main" id="{E27838E5-26D7-714D-830A-A29A1A2817E1}"/>
+                  </a:ext>
+                </a:extLst>
+              </p:cNvPr>
+              <p:cNvSpPr/>
+              <p:nvPr/>
+            </p:nvSpPr>
+            <p:spPr>
+              <a:xfrm>
+                <a:off x="4652867" y="1791350"/>
+                <a:ext cx="2573079" cy="3588488"/>
+              </a:xfrm>
+              <a:prstGeom prst="roundRect">
+                <a:avLst>
+                  <a:gd name="adj" fmla="val 2024"/>
+                </a:avLst>
+              </a:prstGeom>
+              <a:solidFill>
+                <a:schemeClr val="accent5">
+                  <a:lumMod val="20000"/>
+                  <a:lumOff val="80000"/>
+                </a:schemeClr>
+              </a:solidFill>
+              <a:ln w="12700">
+                <a:solidFill>
+                  <a:schemeClr val="tx1"/>
+                </a:solidFill>
+              </a:ln>
+            </p:spPr>
+            <p:style>
+              <a:lnRef idx="2">
+                <a:schemeClr val="accent1">
+                  <a:shade val="50000"/>
+                </a:schemeClr>
+              </a:lnRef>
+              <a:fillRef idx="1">
+                <a:schemeClr val="accent1"/>
+              </a:fillRef>
+              <a:effectRef idx="0">
+                <a:schemeClr val="accent1"/>
+              </a:effectRef>
+              <a:fontRef idx="minor">
+                <a:schemeClr val="lt1"/>
+              </a:fontRef>
+            </p:style>
+            <p:txBody>
+              <a:bodyPr rtlCol="0" anchor="ctr"/>
+              <a:lstStyle/>
+              <a:p>
+                <a:pPr algn="ctr"/>
+                <a:endParaRPr lang="en-CN" dirty="0"/>
+              </a:p>
+            </p:txBody>
+          </p:sp>
+          <p:sp>
+            <p:nvSpPr>
+              <p:cNvPr id="21" name="TextBox 20">
+                <a:extLst>
+                  <a:ext uri="{FF2B5EF4-FFF2-40B4-BE49-F238E27FC236}">
+                    <a16:creationId xmlns:a16="http://schemas.microsoft.com/office/drawing/2014/main" id="{10DE214F-62C9-BB49-90A5-56156934A3FC}"/>
+                  </a:ext>
+                </a:extLst>
+              </p:cNvPr>
+              <p:cNvSpPr txBox="1"/>
+              <p:nvPr/>
+            </p:nvSpPr>
+            <p:spPr>
+              <a:xfrm>
+                <a:off x="4652867" y="1791349"/>
+                <a:ext cx="2573079" cy="400110"/>
+              </a:xfrm>
+              <a:prstGeom prst="rect">
+                <a:avLst/>
+              </a:prstGeom>
+              <a:noFill/>
+            </p:spPr>
+            <p:txBody>
+              <a:bodyPr wrap="square" rtlCol="0" anchor="ctr">
+                <a:spAutoFit/>
+              </a:bodyPr>
+              <a:lstStyle/>
+              <a:p>
+                <a:pPr algn="ctr"/>
+                <a:r>
+                  <a:rPr lang="en-US" altLang="zh-CN" sz="2000" b="1" dirty="0">
+                    <a:latin typeface="Times New Roman" panose="02020603050405020304" pitchFamily="18" charset="0"/>
+                    <a:cs typeface="Times New Roman" panose="02020603050405020304" pitchFamily="18" charset="0"/>
+                  </a:rPr>
+                  <a:t>2.</a:t>
+                </a:r>
+                <a:r>
+                  <a:rPr lang="zh-CN" altLang="en-US" sz="2000" b="1" dirty="0">
+                    <a:latin typeface="Times New Roman" panose="02020603050405020304" pitchFamily="18" charset="0"/>
+                    <a:cs typeface="Times New Roman" panose="02020603050405020304" pitchFamily="18" charset="0"/>
+                  </a:rPr>
+                  <a:t> </a:t>
+                </a:r>
+                <a:r>
+                  <a:rPr lang="en-CN" sz="2000" b="1" dirty="0">
+                    <a:latin typeface="Times New Roman" panose="02020603050405020304" pitchFamily="18" charset="0"/>
+                    <a:cs typeface="Times New Roman" panose="02020603050405020304" pitchFamily="18" charset="0"/>
+                  </a:rPr>
+                  <a:t>Mode</a:t>
+                </a:r>
+                <a:r>
+                  <a:rPr lang="en-US" altLang="zh-CN" sz="2000" b="1" dirty="0">
+                    <a:latin typeface="Times New Roman" panose="02020603050405020304" pitchFamily="18" charset="0"/>
+                    <a:cs typeface="Times New Roman" panose="02020603050405020304" pitchFamily="18" charset="0"/>
+                  </a:rPr>
+                  <a:t>l</a:t>
+                </a:r>
+                <a:endParaRPr lang="en-CN" sz="2000" b="1" dirty="0">
+                  <a:latin typeface="Times New Roman" panose="02020603050405020304" pitchFamily="18" charset="0"/>
+                  <a:cs typeface="Times New Roman" panose="02020603050405020304" pitchFamily="18" charset="0"/>
+                </a:endParaRPr>
+              </a:p>
+            </p:txBody>
+          </p:sp>
+          <p:sp>
+            <p:nvSpPr>
+              <p:cNvPr id="23" name="Rounded Rectangle 22">
+                <a:extLst>
+                  <a:ext uri="{FF2B5EF4-FFF2-40B4-BE49-F238E27FC236}">
+                    <a16:creationId xmlns:a16="http://schemas.microsoft.com/office/drawing/2014/main" id="{E371D180-8698-AD49-A523-AD384B7456A7}"/>
+                  </a:ext>
+                </a:extLst>
+              </p:cNvPr>
+              <p:cNvSpPr/>
+              <p:nvPr/>
+            </p:nvSpPr>
+            <p:spPr>
+              <a:xfrm>
+                <a:off x="4780457" y="3282566"/>
+                <a:ext cx="2317897" cy="606056"/>
+              </a:xfrm>
+              <a:prstGeom prst="roundRect">
+                <a:avLst/>
+              </a:prstGeom>
+              <a:solidFill>
+                <a:schemeClr val="accent5">
+                  <a:lumMod val="40000"/>
+                  <a:lumOff val="60000"/>
+                </a:schemeClr>
+              </a:solidFill>
+              <a:ln w="12700">
+                <a:solidFill>
+                  <a:schemeClr val="accent6">
+                    <a:lumMod val="50000"/>
+                  </a:schemeClr>
+                </a:solidFill>
+              </a:ln>
+            </p:spPr>
+            <p:style>
+              <a:lnRef idx="2">
+                <a:schemeClr val="accent1">
+                  <a:shade val="50000"/>
+                </a:schemeClr>
+              </a:lnRef>
+              <a:fillRef idx="1">
+                <a:schemeClr val="accent1"/>
+              </a:fillRef>
+              <a:effectRef idx="0">
+                <a:schemeClr val="accent1"/>
+              </a:effectRef>
+              <a:fontRef idx="minor">
+                <a:schemeClr val="lt1"/>
+              </a:fontRef>
+            </p:style>
+            <p:txBody>
+              <a:bodyPr rtlCol="0" anchor="ctr"/>
+              <a:lstStyle/>
+              <a:p>
+                <a:pPr algn="ctr"/>
+                <a:r>
+                  <a:rPr lang="en-CN" sz="1600" dirty="0">
+                    <a:solidFill>
+                      <a:schemeClr val="tx1"/>
+                    </a:solidFill>
+                    <a:latin typeface="Times New Roman" panose="02020603050405020304" pitchFamily="18" charset="0"/>
+                    <a:cs typeface="Times New Roman" panose="02020603050405020304" pitchFamily="18" charset="0"/>
+                  </a:rPr>
+                  <a:t>Buil Up the</a:t>
+                </a:r>
+              </a:p>
+              <a:p>
+                <a:pPr algn="ctr"/>
+                <a:r>
+                  <a:rPr lang="en-CN" sz="1600" dirty="0">
+                    <a:solidFill>
+                      <a:schemeClr val="tx1"/>
+                    </a:solidFill>
+                    <a:latin typeface="Times New Roman" panose="02020603050405020304" pitchFamily="18" charset="0"/>
+                    <a:cs typeface="Times New Roman" panose="02020603050405020304" pitchFamily="18" charset="0"/>
+                  </a:rPr>
+                  <a:t>Multi-CNN</a:t>
+                </a:r>
+              </a:p>
+            </p:txBody>
+          </p:sp>
+        </p:grpSp>
+        <p:cxnSp>
+          <p:nvCxnSpPr>
+            <p:cNvPr id="8" name="Straight Arrow Connector 7">
+              <a:extLst>
+                <a:ext uri="{FF2B5EF4-FFF2-40B4-BE49-F238E27FC236}">
+                  <a16:creationId xmlns:a16="http://schemas.microsoft.com/office/drawing/2014/main" id="{6C14BE2F-7C5E-FC40-9EAB-BBBA31250F42}"/>
+                </a:ext>
+              </a:extLst>
+            </p:cNvPr>
+            <p:cNvCxnSpPr>
+              <a:cxnSpLocks/>
+              <a:stCxn id="20" idx="3"/>
+              <a:endCxn id="13" idx="1"/>
+            </p:cNvCxnSpPr>
+            <p:nvPr/>
+          </p:nvCxnSpPr>
+          <p:spPr>
+            <a:xfrm>
+              <a:off x="7382539" y="3585594"/>
+              <a:ext cx="993754" cy="0"/>
+            </a:xfrm>
+            <a:prstGeom prst="straightConnector1">
+              <a:avLst/>
+            </a:prstGeom>
+            <a:ln w="12700">
+              <a:solidFill>
+                <a:schemeClr val="tx1"/>
+              </a:solidFill>
+              <a:tailEnd type="stealth" w="lg" len="lg"/>
+            </a:ln>
+          </p:spPr>
+          <p:style>
+            <a:lnRef idx="1">
+              <a:schemeClr val="accent1"/>
+            </a:lnRef>
+            <a:fillRef idx="0">
+              <a:schemeClr val="accent1"/>
+            </a:fillRef>
+            <a:effectRef idx="0">
+              <a:schemeClr val="accent1"/>
+            </a:effectRef>
+            <a:fontRef idx="minor">
+              <a:schemeClr val="tx1"/>
+            </a:fontRef>
+          </p:style>
+        </p:cxnSp>
+        <p:pic>
+          <p:nvPicPr>
+            <p:cNvPr id="9" name="Graphic 8">
+              <a:extLst>
+                <a:ext uri="{FF2B5EF4-FFF2-40B4-BE49-F238E27FC236}">
+                  <a16:creationId xmlns:a16="http://schemas.microsoft.com/office/drawing/2014/main" id="{D484D084-48D1-D34E-B9E0-06997F1F9496}"/>
+                </a:ext>
+              </a:extLst>
+            </p:cNvPr>
+            <p:cNvPicPr>
+              <a:picLocks noChangeAspect="1"/>
+            </p:cNvPicPr>
+            <p:nvPr/>
+          </p:nvPicPr>
+          <p:blipFill>
+            <a:blip r:embed="rId2">
+              <a:extLst>
+                <a:ext uri="{96DAC541-7B7A-43D3-8B79-37D633B846F1}">
+                  <asvg:svgBlip xmlns:asvg="http://schemas.microsoft.com/office/drawing/2016/SVG/main" r:embed="rId3"/>
+                </a:ext>
+              </a:extLst>
+            </a:blip>
+            <a:stretch>
+              <a:fillRect/>
+            </a:stretch>
+          </p:blipFill>
+          <p:spPr>
+            <a:xfrm>
+              <a:off x="3502519" y="1474293"/>
+              <a:ext cx="626374" cy="626374"/>
+            </a:xfrm>
+            <a:prstGeom prst="rect">
+              <a:avLst/>
+            </a:prstGeom>
+          </p:spPr>
+        </p:pic>
+        <p:pic>
+          <p:nvPicPr>
+            <p:cNvPr id="10" name="Graphic 9">
+              <a:extLst>
+                <a:ext uri="{FF2B5EF4-FFF2-40B4-BE49-F238E27FC236}">
+                  <a16:creationId xmlns:a16="http://schemas.microsoft.com/office/drawing/2014/main" id="{B30EF580-4312-184C-80B3-349ABAD4FCDD}"/>
+                </a:ext>
+              </a:extLst>
+            </p:cNvPr>
+            <p:cNvPicPr>
+              <a:picLocks noChangeAspect="1"/>
+            </p:cNvPicPr>
+            <p:nvPr/>
+          </p:nvPicPr>
+          <p:blipFill>
+            <a:blip r:embed="rId4">
+              <a:extLst>
+                <a:ext uri="{96DAC541-7B7A-43D3-8B79-37D633B846F1}">
+                  <asvg:svgBlip xmlns:asvg="http://schemas.microsoft.com/office/drawing/2016/SVG/main" r:embed="rId5"/>
+                </a:ext>
+              </a:extLst>
+            </a:blip>
+            <a:stretch>
+              <a:fillRect/>
+            </a:stretch>
+          </p:blipFill>
+          <p:spPr>
+            <a:xfrm>
+              <a:off x="7121185" y="1529611"/>
+              <a:ext cx="522708" cy="515738"/>
+            </a:xfrm>
+            <a:prstGeom prst="rect">
+              <a:avLst/>
+            </a:prstGeom>
+          </p:spPr>
+        </p:pic>
+        <p:grpSp>
+          <p:nvGrpSpPr>
+            <p:cNvPr id="11" name="Group 10">
+              <a:extLst>
+                <a:ext uri="{FF2B5EF4-FFF2-40B4-BE49-F238E27FC236}">
+                  <a16:creationId xmlns:a16="http://schemas.microsoft.com/office/drawing/2014/main" id="{3A8E3C05-350A-F147-B061-A1D974BA1A03}"/>
+                </a:ext>
+              </a:extLst>
+            </p:cNvPr>
+            <p:cNvGrpSpPr/>
+            <p:nvPr/>
+          </p:nvGrpSpPr>
+          <p:grpSpPr>
+            <a:xfrm>
+              <a:off x="8376293" y="1791349"/>
+              <a:ext cx="2573079" cy="3588489"/>
+              <a:chOff x="8376293" y="1791349"/>
+              <a:chExt cx="2573079" cy="3588489"/>
+            </a:xfrm>
+          </p:grpSpPr>
+          <p:sp>
+            <p:nvSpPr>
+              <p:cNvPr id="13" name="Rounded Rectangle 12">
+                <a:extLst>
+                  <a:ext uri="{FF2B5EF4-FFF2-40B4-BE49-F238E27FC236}">
+                    <a16:creationId xmlns:a16="http://schemas.microsoft.com/office/drawing/2014/main" id="{53B245B9-3455-B24A-BE4F-EC6F6B8F31A7}"/>
+                  </a:ext>
+                </a:extLst>
+              </p:cNvPr>
+              <p:cNvSpPr/>
+              <p:nvPr/>
+            </p:nvSpPr>
+            <p:spPr>
+              <a:xfrm>
+                <a:off x="8376293" y="1791350"/>
+                <a:ext cx="2573079" cy="3588488"/>
+              </a:xfrm>
+              <a:prstGeom prst="roundRect">
+                <a:avLst>
+                  <a:gd name="adj" fmla="val 2024"/>
+                </a:avLst>
+              </a:prstGeom>
+              <a:solidFill>
+                <a:schemeClr val="accent2">
+                  <a:lumMod val="20000"/>
+                  <a:lumOff val="80000"/>
+                </a:schemeClr>
+              </a:solidFill>
+              <a:ln w="12700">
+                <a:solidFill>
+                  <a:schemeClr val="tx1"/>
+                </a:solidFill>
+              </a:ln>
+            </p:spPr>
+            <p:style>
+              <a:lnRef idx="2">
+                <a:schemeClr val="accent1">
+                  <a:shade val="50000"/>
+                </a:schemeClr>
+              </a:lnRef>
+              <a:fillRef idx="1">
+                <a:schemeClr val="accent1"/>
+              </a:fillRef>
+              <a:effectRef idx="0">
+                <a:schemeClr val="accent1"/>
+              </a:effectRef>
+              <a:fontRef idx="minor">
+                <a:schemeClr val="lt1"/>
+              </a:fontRef>
+            </p:style>
+            <p:txBody>
+              <a:bodyPr rtlCol="0" anchor="ctr"/>
+              <a:lstStyle/>
+              <a:p>
+                <a:pPr algn="ctr"/>
+                <a:endParaRPr lang="en-CN" dirty="0"/>
+              </a:p>
+            </p:txBody>
+          </p:sp>
+          <p:sp>
+            <p:nvSpPr>
+              <p:cNvPr id="14" name="TextBox 13">
+                <a:extLst>
+                  <a:ext uri="{FF2B5EF4-FFF2-40B4-BE49-F238E27FC236}">
+                    <a16:creationId xmlns:a16="http://schemas.microsoft.com/office/drawing/2014/main" id="{9F1F72DF-5B69-4A44-A95C-1FA796E88981}"/>
+                  </a:ext>
+                </a:extLst>
+              </p:cNvPr>
+              <p:cNvSpPr txBox="1"/>
+              <p:nvPr/>
+            </p:nvSpPr>
+            <p:spPr>
+              <a:xfrm>
+                <a:off x="8376293" y="1791349"/>
+                <a:ext cx="2573079" cy="400110"/>
+              </a:xfrm>
+              <a:prstGeom prst="rect">
+                <a:avLst/>
+              </a:prstGeom>
+              <a:noFill/>
+            </p:spPr>
+            <p:txBody>
+              <a:bodyPr wrap="square" rtlCol="0" anchor="ctr">
+                <a:spAutoFit/>
+              </a:bodyPr>
+              <a:lstStyle/>
+              <a:p>
+                <a:pPr algn="ctr"/>
+                <a:r>
+                  <a:rPr lang="en-US" altLang="zh-CN" sz="2000" b="1" dirty="0">
+                    <a:latin typeface="Times New Roman" panose="02020603050405020304" pitchFamily="18" charset="0"/>
+                    <a:cs typeface="Times New Roman" panose="02020603050405020304" pitchFamily="18" charset="0"/>
+                  </a:rPr>
+                  <a:t>3.</a:t>
+                </a:r>
+                <a:r>
+                  <a:rPr lang="zh-CN" altLang="en-US" sz="2000" b="1" dirty="0">
+                    <a:latin typeface="Times New Roman" panose="02020603050405020304" pitchFamily="18" charset="0"/>
+                    <a:cs typeface="Times New Roman" panose="02020603050405020304" pitchFamily="18" charset="0"/>
+                  </a:rPr>
+                  <a:t> </a:t>
+                </a:r>
+                <a:r>
+                  <a:rPr lang="en-CN" sz="2000" b="1" dirty="0">
+                    <a:latin typeface="Times New Roman" panose="02020603050405020304" pitchFamily="18" charset="0"/>
+                    <a:cs typeface="Times New Roman" panose="02020603050405020304" pitchFamily="18" charset="0"/>
+                  </a:rPr>
+                  <a:t>Experiment</a:t>
+                </a:r>
+              </a:p>
+            </p:txBody>
+          </p:sp>
+          <p:sp>
+            <p:nvSpPr>
+              <p:cNvPr id="15" name="Rounded Rectangle 14">
+                <a:extLst>
+                  <a:ext uri="{FF2B5EF4-FFF2-40B4-BE49-F238E27FC236}">
+                    <a16:creationId xmlns:a16="http://schemas.microsoft.com/office/drawing/2014/main" id="{643E2ACC-F60D-BF49-8EA2-C717B049F023}"/>
+                  </a:ext>
+                </a:extLst>
+              </p:cNvPr>
+              <p:cNvSpPr/>
+              <p:nvPr/>
+            </p:nvSpPr>
+            <p:spPr>
+              <a:xfrm>
+                <a:off x="8503883" y="2492148"/>
+                <a:ext cx="2317897" cy="606056"/>
+              </a:xfrm>
+              <a:prstGeom prst="roundRect">
+                <a:avLst/>
+              </a:prstGeom>
+              <a:solidFill>
+                <a:schemeClr val="accent2">
+                  <a:lumMod val="40000"/>
+                  <a:lumOff val="60000"/>
+                </a:schemeClr>
+              </a:solidFill>
+              <a:ln w="12700">
+                <a:solidFill>
+                  <a:schemeClr val="accent6">
+                    <a:lumMod val="50000"/>
+                  </a:schemeClr>
+                </a:solidFill>
+              </a:ln>
+            </p:spPr>
+            <p:style>
+              <a:lnRef idx="2">
+                <a:schemeClr val="accent1">
+                  <a:shade val="50000"/>
+                </a:schemeClr>
+              </a:lnRef>
+              <a:fillRef idx="1">
+                <a:schemeClr val="accent1"/>
+              </a:fillRef>
+              <a:effectRef idx="0">
+                <a:schemeClr val="accent1"/>
+              </a:effectRef>
+              <a:fontRef idx="minor">
+                <a:schemeClr val="lt1"/>
+              </a:fontRef>
+            </p:style>
+            <p:txBody>
+              <a:bodyPr rtlCol="0" anchor="ctr"/>
+              <a:lstStyle/>
+              <a:p>
+                <a:pPr algn="ctr"/>
+                <a:r>
+                  <a:rPr lang="en-CN" sz="1600" dirty="0">
+                    <a:solidFill>
+                      <a:schemeClr val="tx1"/>
+                    </a:solidFill>
+                    <a:latin typeface="Times New Roman" panose="02020603050405020304" pitchFamily="18" charset="0"/>
+                    <a:cs typeface="Times New Roman" panose="02020603050405020304" pitchFamily="18" charset="0"/>
+                  </a:rPr>
+                  <a:t>Start</a:t>
+                </a:r>
+              </a:p>
+              <a:p>
+                <a:pPr algn="ctr"/>
+                <a:r>
+                  <a:rPr lang="en-CN" sz="1600" dirty="0">
+                    <a:solidFill>
+                      <a:schemeClr val="tx1"/>
+                    </a:solidFill>
+                    <a:latin typeface="Times New Roman" panose="02020603050405020304" pitchFamily="18" charset="0"/>
+                    <a:cs typeface="Times New Roman" panose="02020603050405020304" pitchFamily="18" charset="0"/>
+                  </a:rPr>
+                  <a:t>Train</a:t>
+                </a:r>
+                <a:r>
+                  <a:rPr lang="zh-CN" altLang="en-US" sz="1600" dirty="0">
+                    <a:solidFill>
+                      <a:schemeClr val="tx1"/>
+                    </a:solidFill>
+                    <a:latin typeface="Times New Roman" panose="02020603050405020304" pitchFamily="18" charset="0"/>
+                    <a:cs typeface="Times New Roman" panose="02020603050405020304" pitchFamily="18" charset="0"/>
+                  </a:rPr>
+                  <a:t> </a:t>
+                </a:r>
+                <a:r>
+                  <a:rPr lang="en-US" altLang="zh-CN" sz="1600" dirty="0">
+                    <a:solidFill>
+                      <a:schemeClr val="tx1"/>
+                    </a:solidFill>
+                    <a:latin typeface="Times New Roman" panose="02020603050405020304" pitchFamily="18" charset="0"/>
+                    <a:cs typeface="Times New Roman" panose="02020603050405020304" pitchFamily="18" charset="0"/>
+                  </a:rPr>
+                  <a:t>&amp;</a:t>
+                </a:r>
+                <a:r>
+                  <a:rPr lang="zh-CN" altLang="en-US" sz="1600" dirty="0">
+                    <a:solidFill>
+                      <a:schemeClr val="tx1"/>
+                    </a:solidFill>
+                    <a:latin typeface="Times New Roman" panose="02020603050405020304" pitchFamily="18" charset="0"/>
+                    <a:cs typeface="Times New Roman" panose="02020603050405020304" pitchFamily="18" charset="0"/>
+                  </a:rPr>
+                  <a:t> </a:t>
+                </a:r>
+                <a:r>
+                  <a:rPr lang="en-US" altLang="zh-CN" sz="1600" dirty="0">
+                    <a:solidFill>
+                      <a:schemeClr val="tx1"/>
+                    </a:solidFill>
+                    <a:latin typeface="Times New Roman" panose="02020603050405020304" pitchFamily="18" charset="0"/>
+                    <a:cs typeface="Times New Roman" panose="02020603050405020304" pitchFamily="18" charset="0"/>
+                  </a:rPr>
+                  <a:t>Validation</a:t>
+                </a:r>
+                <a:endParaRPr lang="en-CN" sz="1600" dirty="0">
+                  <a:solidFill>
+                    <a:schemeClr val="tx1"/>
+                  </a:solidFill>
+                  <a:latin typeface="Times New Roman" panose="02020603050405020304" pitchFamily="18" charset="0"/>
+                  <a:cs typeface="Times New Roman" panose="02020603050405020304" pitchFamily="18" charset="0"/>
+                </a:endParaRPr>
+              </a:p>
+            </p:txBody>
+          </p:sp>
+          <p:sp>
+            <p:nvSpPr>
+              <p:cNvPr id="16" name="Rounded Rectangle 15">
+                <a:extLst>
+                  <a:ext uri="{FF2B5EF4-FFF2-40B4-BE49-F238E27FC236}">
+                    <a16:creationId xmlns:a16="http://schemas.microsoft.com/office/drawing/2014/main" id="{75A43F25-FB21-5742-9FFA-161F3C07765D}"/>
+                  </a:ext>
+                </a:extLst>
+              </p:cNvPr>
+              <p:cNvSpPr/>
+              <p:nvPr/>
+            </p:nvSpPr>
+            <p:spPr>
+              <a:xfrm>
+                <a:off x="8503883" y="3481609"/>
+                <a:ext cx="2317897" cy="606056"/>
+              </a:xfrm>
+              <a:prstGeom prst="roundRect">
+                <a:avLst/>
+              </a:prstGeom>
+              <a:solidFill>
+                <a:schemeClr val="accent2">
+                  <a:lumMod val="40000"/>
+                  <a:lumOff val="60000"/>
+                </a:schemeClr>
+              </a:solidFill>
+              <a:ln w="12700">
+                <a:solidFill>
+                  <a:schemeClr val="accent6">
+                    <a:lumMod val="50000"/>
+                  </a:schemeClr>
+                </a:solidFill>
+              </a:ln>
+            </p:spPr>
+            <p:style>
+              <a:lnRef idx="2">
+                <a:schemeClr val="accent1">
+                  <a:shade val="50000"/>
+                </a:schemeClr>
+              </a:lnRef>
+              <a:fillRef idx="1">
+                <a:schemeClr val="accent1"/>
+              </a:fillRef>
+              <a:effectRef idx="0">
+                <a:schemeClr val="accent1"/>
+              </a:effectRef>
+              <a:fontRef idx="minor">
+                <a:schemeClr val="lt1"/>
+              </a:fontRef>
+            </p:style>
+            <p:txBody>
+              <a:bodyPr rtlCol="0" anchor="ctr"/>
+              <a:lstStyle/>
+              <a:p>
+                <a:pPr algn="ctr"/>
+                <a:r>
+                  <a:rPr lang="en-CN" sz="1600" dirty="0">
+                    <a:solidFill>
+                      <a:schemeClr val="tx1"/>
+                    </a:solidFill>
+                    <a:latin typeface="Times New Roman" panose="02020603050405020304" pitchFamily="18" charset="0"/>
+                    <a:cs typeface="Times New Roman" panose="02020603050405020304" pitchFamily="18" charset="0"/>
+                  </a:rPr>
+                  <a:t>Adjust Model Structure</a:t>
+                </a:r>
+              </a:p>
+              <a:p>
+                <a:pPr algn="ctr"/>
+                <a:r>
+                  <a:rPr lang="en-US" sz="1600" dirty="0">
+                    <a:solidFill>
+                      <a:schemeClr val="tx1"/>
+                    </a:solidFill>
+                    <a:latin typeface="Times New Roman" panose="02020603050405020304" pitchFamily="18" charset="0"/>
+                    <a:cs typeface="Times New Roman" panose="02020603050405020304" pitchFamily="18" charset="0"/>
+                  </a:rPr>
+                  <a:t>A</a:t>
+                </a:r>
+                <a:r>
+                  <a:rPr lang="en-CN" sz="1600" dirty="0">
+                    <a:solidFill>
+                      <a:schemeClr val="tx1"/>
+                    </a:solidFill>
+                    <a:latin typeface="Times New Roman" panose="02020603050405020304" pitchFamily="18" charset="0"/>
+                    <a:cs typeface="Times New Roman" panose="02020603050405020304" pitchFamily="18" charset="0"/>
+                  </a:rPr>
+                  <a:t>nd </a:t>
+                </a:r>
+                <a:r>
+                  <a:rPr lang="en-US" sz="1600" dirty="0">
+                    <a:solidFill>
+                      <a:schemeClr val="tx1"/>
+                    </a:solidFill>
+                    <a:latin typeface="Times New Roman" panose="02020603050405020304" pitchFamily="18" charset="0"/>
+                    <a:cs typeface="Times New Roman" panose="02020603050405020304" pitchFamily="18" charset="0"/>
+                  </a:rPr>
+                  <a:t>Hyperparameters</a:t>
+                </a:r>
+                <a:r>
+                  <a:rPr lang="en-CN" sz="1600" dirty="0">
+                    <a:solidFill>
+                      <a:schemeClr val="tx1"/>
+                    </a:solidFill>
+                    <a:latin typeface="Times New Roman" panose="02020603050405020304" pitchFamily="18" charset="0"/>
+                    <a:cs typeface="Times New Roman" panose="02020603050405020304" pitchFamily="18" charset="0"/>
+                  </a:rPr>
+                  <a:t> </a:t>
+                </a:r>
+              </a:p>
+            </p:txBody>
+          </p:sp>
+          <p:sp>
+            <p:nvSpPr>
+              <p:cNvPr id="17" name="Rounded Rectangle 16">
+                <a:extLst>
+                  <a:ext uri="{FF2B5EF4-FFF2-40B4-BE49-F238E27FC236}">
+                    <a16:creationId xmlns:a16="http://schemas.microsoft.com/office/drawing/2014/main" id="{B7218624-954F-7542-B5A9-EAAD9BED1307}"/>
+                  </a:ext>
+                </a:extLst>
+              </p:cNvPr>
+              <p:cNvSpPr/>
+              <p:nvPr/>
+            </p:nvSpPr>
+            <p:spPr>
+              <a:xfrm>
+                <a:off x="8503883" y="4473093"/>
+                <a:ext cx="2317897" cy="606056"/>
+              </a:xfrm>
+              <a:prstGeom prst="roundRect">
+                <a:avLst/>
+              </a:prstGeom>
+              <a:solidFill>
+                <a:schemeClr val="accent2">
+                  <a:lumMod val="40000"/>
+                  <a:lumOff val="60000"/>
+                </a:schemeClr>
+              </a:solidFill>
+              <a:ln w="12700">
+                <a:solidFill>
+                  <a:schemeClr val="accent6">
+                    <a:lumMod val="50000"/>
+                  </a:schemeClr>
+                </a:solidFill>
+              </a:ln>
+            </p:spPr>
+            <p:style>
+              <a:lnRef idx="2">
+                <a:schemeClr val="accent1">
+                  <a:shade val="50000"/>
+                </a:schemeClr>
+              </a:lnRef>
+              <a:fillRef idx="1">
+                <a:schemeClr val="accent1"/>
+              </a:fillRef>
+              <a:effectRef idx="0">
+                <a:schemeClr val="accent1"/>
+              </a:effectRef>
+              <a:fontRef idx="minor">
+                <a:schemeClr val="lt1"/>
+              </a:fontRef>
+            </p:style>
+            <p:txBody>
+              <a:bodyPr rtlCol="0" anchor="ctr"/>
+              <a:lstStyle/>
+              <a:p>
+                <a:pPr algn="ctr"/>
+                <a:r>
+                  <a:rPr lang="en-CN" sz="1600" dirty="0">
+                    <a:solidFill>
+                      <a:schemeClr val="tx1"/>
+                    </a:solidFill>
+                    <a:latin typeface="Times New Roman" panose="02020603050405020304" pitchFamily="18" charset="0"/>
+                    <a:cs typeface="Times New Roman" panose="02020603050405020304" pitchFamily="18" charset="0"/>
+                  </a:rPr>
+                  <a:t>Analyse </a:t>
+                </a:r>
+              </a:p>
+              <a:p>
+                <a:pPr algn="ctr"/>
+                <a:r>
+                  <a:rPr lang="en-CN" sz="1600" dirty="0">
+                    <a:solidFill>
+                      <a:schemeClr val="tx1"/>
+                    </a:solidFill>
+                    <a:latin typeface="Times New Roman" panose="02020603050405020304" pitchFamily="18" charset="0"/>
+                    <a:cs typeface="Times New Roman" panose="02020603050405020304" pitchFamily="18" charset="0"/>
+                  </a:rPr>
+                  <a:t>Experiment Result</a:t>
+                </a:r>
+              </a:p>
+            </p:txBody>
+          </p:sp>
+          <p:cxnSp>
+            <p:nvCxnSpPr>
+              <p:cNvPr id="18" name="Straight Arrow Connector 17">
+                <a:extLst>
+                  <a:ext uri="{FF2B5EF4-FFF2-40B4-BE49-F238E27FC236}">
+                    <a16:creationId xmlns:a16="http://schemas.microsoft.com/office/drawing/2014/main" id="{BFD4F4EF-F58D-BC45-A174-82151DFB175C}"/>
+                  </a:ext>
+                </a:extLst>
+              </p:cNvPr>
+              <p:cNvCxnSpPr>
+                <a:cxnSpLocks/>
+                <a:stCxn id="15" idx="2"/>
+                <a:endCxn id="16" idx="0"/>
+              </p:cNvCxnSpPr>
+              <p:nvPr/>
+            </p:nvCxnSpPr>
+            <p:spPr>
+              <a:xfrm>
+                <a:off x="9662832" y="3098204"/>
+                <a:ext cx="0" cy="383405"/>
+              </a:xfrm>
+              <a:prstGeom prst="straightConnector1">
+                <a:avLst/>
+              </a:prstGeom>
+              <a:ln w="12700">
+                <a:solidFill>
+                  <a:schemeClr val="tx1"/>
+                </a:solidFill>
+                <a:tailEnd type="stealth" w="lg" len="lg"/>
+              </a:ln>
+            </p:spPr>
+            <p:style>
+              <a:lnRef idx="1">
+                <a:schemeClr val="accent1"/>
+              </a:lnRef>
+              <a:fillRef idx="0">
+                <a:schemeClr val="accent1"/>
+              </a:fillRef>
+              <a:effectRef idx="0">
+                <a:schemeClr val="accent1"/>
+              </a:effectRef>
+              <a:fontRef idx="minor">
+                <a:schemeClr val="tx1"/>
+              </a:fontRef>
+            </p:style>
+          </p:cxnSp>
+          <p:cxnSp>
+            <p:nvCxnSpPr>
+              <p:cNvPr id="19" name="Straight Arrow Connector 18">
+                <a:extLst>
+                  <a:ext uri="{FF2B5EF4-FFF2-40B4-BE49-F238E27FC236}">
+                    <a16:creationId xmlns:a16="http://schemas.microsoft.com/office/drawing/2014/main" id="{244621CD-1D22-6349-BFD4-FF57B97183B1}"/>
+                  </a:ext>
+                </a:extLst>
+              </p:cNvPr>
+              <p:cNvCxnSpPr>
+                <a:cxnSpLocks/>
+                <a:stCxn id="16" idx="2"/>
+                <a:endCxn id="17" idx="0"/>
+              </p:cNvCxnSpPr>
+              <p:nvPr/>
+            </p:nvCxnSpPr>
+            <p:spPr>
+              <a:xfrm>
+                <a:off x="9662832" y="4087665"/>
+                <a:ext cx="0" cy="385428"/>
+              </a:xfrm>
+              <a:prstGeom prst="straightConnector1">
+                <a:avLst/>
+              </a:prstGeom>
+              <a:ln w="12700">
+                <a:solidFill>
+                  <a:schemeClr val="tx1"/>
+                </a:solidFill>
+                <a:tailEnd type="stealth" w="lg" len="lg"/>
+              </a:ln>
+            </p:spPr>
+            <p:style>
+              <a:lnRef idx="1">
+                <a:schemeClr val="accent1"/>
+              </a:lnRef>
+              <a:fillRef idx="0">
+                <a:schemeClr val="accent1"/>
+              </a:fillRef>
+              <a:effectRef idx="0">
+                <a:schemeClr val="accent1"/>
+              </a:effectRef>
+              <a:fontRef idx="minor">
+                <a:schemeClr val="tx1"/>
+              </a:fontRef>
+            </p:style>
+          </p:cxnSp>
+        </p:grpSp>
+        <p:pic>
+          <p:nvPicPr>
+            <p:cNvPr id="12" name="Graphic 11">
+              <a:extLst>
+                <a:ext uri="{FF2B5EF4-FFF2-40B4-BE49-F238E27FC236}">
+                  <a16:creationId xmlns:a16="http://schemas.microsoft.com/office/drawing/2014/main" id="{D06D4271-5222-9C4C-B556-A0EB33F8A9A6}"/>
+                </a:ext>
+              </a:extLst>
+            </p:cNvPr>
+            <p:cNvPicPr>
+              <a:picLocks noChangeAspect="1"/>
+            </p:cNvPicPr>
+            <p:nvPr/>
+          </p:nvPicPr>
+          <p:blipFill>
+            <a:blip r:embed="rId6">
+              <a:extLst>
+                <a:ext uri="{96DAC541-7B7A-43D3-8B79-37D633B846F1}">
+                  <asvg:svgBlip xmlns:asvg="http://schemas.microsoft.com/office/drawing/2016/SVG/main" r:embed="rId7"/>
+                </a:ext>
+              </a:extLst>
+            </a:blip>
+            <a:stretch>
+              <a:fillRect/>
+            </a:stretch>
+          </p:blipFill>
+          <p:spPr>
+            <a:xfrm>
+              <a:off x="10693772" y="1532634"/>
+              <a:ext cx="511200" cy="511200"/>
+            </a:xfrm>
+            <a:prstGeom prst="rect">
+              <a:avLst/>
+            </a:prstGeom>
+          </p:spPr>
+        </p:pic>
+        <p:cxnSp>
+          <p:nvCxnSpPr>
+            <p:cNvPr id="35" name="Straight Arrow Connector 34">
+              <a:extLst>
+                <a:ext uri="{FF2B5EF4-FFF2-40B4-BE49-F238E27FC236}">
+                  <a16:creationId xmlns:a16="http://schemas.microsoft.com/office/drawing/2014/main" id="{42F196E8-E2B1-3D4C-8E74-3B7FF467FCBA}"/>
+                </a:ext>
+              </a:extLst>
+            </p:cNvPr>
+            <p:cNvCxnSpPr>
+              <a:cxnSpLocks/>
+              <a:stCxn id="27" idx="3"/>
+              <a:endCxn id="20" idx="1"/>
+            </p:cNvCxnSpPr>
+            <p:nvPr/>
+          </p:nvCxnSpPr>
+          <p:spPr>
+            <a:xfrm flipV="1">
+              <a:off x="3815706" y="3585594"/>
+              <a:ext cx="993754" cy="649"/>
+            </a:xfrm>
+            <a:prstGeom prst="straightConnector1">
+              <a:avLst/>
+            </a:prstGeom>
+            <a:ln w="12700">
+              <a:solidFill>
+                <a:schemeClr val="tx1"/>
+              </a:solidFill>
+              <a:tailEnd type="stealth" w="lg" len="lg"/>
+            </a:ln>
+          </p:spPr>
+          <p:style>
+            <a:lnRef idx="1">
+              <a:schemeClr val="accent1"/>
+            </a:lnRef>
+            <a:fillRef idx="0">
+              <a:schemeClr val="accent1"/>
+            </a:fillRef>
+            <a:effectRef idx="0">
+              <a:schemeClr val="accent1"/>
+            </a:effectRef>
+            <a:fontRef idx="minor">
+              <a:schemeClr val="tx1"/>
+            </a:fontRef>
+          </p:style>
+        </p:cxnSp>
+      </p:grpSp>
+    </p:spTree>
+    <p:extLst>
+      <p:ext uri="{BB962C8B-B14F-4D97-AF65-F5344CB8AC3E}">
+        <p14:creationId xmlns:p14="http://schemas.microsoft.com/office/powerpoint/2010/main" val="1039580852"/>
+      </p:ext>
+    </p:extLst>
+  </p:cSld>
+  <p:clrMapOvr>
+    <a:masterClrMapping/>
+  </p:clrMapOvr>
+</p:sld>
+</file>
+
+<file path=ppt/slides/slide3.xml><?xml version="1.0" encoding="utf-8"?>
+<p:sld xmlns:a="http://schemas.openxmlformats.org/drawingml/2006/main" xmlns:r="http://schemas.openxmlformats.org/officeDocument/2006/relationships" xmlns:p="http://schemas.openxmlformats.org/presentationml/2006/main">
+  <p:cSld>
+    <p:spTree>
+      <p:nvGrpSpPr>
+        <p:cNvPr id="1" name=""/>
+        <p:cNvGrpSpPr/>
+        <p:nvPr/>
+      </p:nvGrpSpPr>
+      <p:grpSpPr>
+        <a:xfrm>
+          <a:off x="0" y="0"/>
+          <a:ext cx="0" cy="0"/>
+          <a:chOff x="0" y="0"/>
+          <a:chExt cx="0" cy="0"/>
+        </a:xfrm>
+      </p:grpSpPr>
+      <p:grpSp>
+        <p:nvGrpSpPr>
+          <p:cNvPr id="9" name="Group 8">
+            <a:extLst>
+              <a:ext uri="{FF2B5EF4-FFF2-40B4-BE49-F238E27FC236}">
+                <a16:creationId xmlns:a16="http://schemas.microsoft.com/office/drawing/2014/main" id="{0B3EEDBA-F21F-CE4C-A170-A0A8697AB2D8}"/>
+              </a:ext>
+            </a:extLst>
+          </p:cNvPr>
+          <p:cNvGrpSpPr/>
+          <p:nvPr/>
+        </p:nvGrpSpPr>
+        <p:grpSpPr>
+          <a:xfrm>
+            <a:off x="3490796" y="720766"/>
+            <a:ext cx="5210407" cy="5416468"/>
+            <a:chOff x="3490796" y="720766"/>
+            <a:chExt cx="5210407" cy="5416468"/>
+          </a:xfrm>
+        </p:grpSpPr>
+        <p:pic>
+          <p:nvPicPr>
+            <p:cNvPr id="5" name="Picture 4">
+              <a:extLst>
+                <a:ext uri="{FF2B5EF4-FFF2-40B4-BE49-F238E27FC236}">
+                  <a16:creationId xmlns:a16="http://schemas.microsoft.com/office/drawing/2014/main" id="{1BD0860C-EB53-F142-93A5-A0D5CDF5AE3D}"/>
+                </a:ext>
+              </a:extLst>
+            </p:cNvPr>
+            <p:cNvPicPr>
+              <a:picLocks noChangeAspect="1"/>
+            </p:cNvPicPr>
+            <p:nvPr/>
+          </p:nvPicPr>
+          <p:blipFill>
+            <a:blip r:embed="rId2"/>
+            <a:stretch>
+              <a:fillRect/>
+            </a:stretch>
+          </p:blipFill>
+          <p:spPr>
+            <a:xfrm>
+              <a:off x="3490796" y="720766"/>
+              <a:ext cx="5210407" cy="5416468"/>
+            </a:xfrm>
+            <a:prstGeom prst="rect">
+              <a:avLst/>
+            </a:prstGeom>
+          </p:spPr>
+        </p:pic>
+        <p:cxnSp>
+          <p:nvCxnSpPr>
+            <p:cNvPr id="7" name="Straight Connector 6">
+              <a:extLst>
+                <a:ext uri="{FF2B5EF4-FFF2-40B4-BE49-F238E27FC236}">
+                  <a16:creationId xmlns:a16="http://schemas.microsoft.com/office/drawing/2014/main" id="{93959742-5D44-CF47-A4D7-11A60840166F}"/>
+                </a:ext>
+              </a:extLst>
+            </p:cNvPr>
+            <p:cNvCxnSpPr>
+              <a:cxnSpLocks/>
+            </p:cNvCxnSpPr>
+            <p:nvPr/>
+          </p:nvCxnSpPr>
+          <p:spPr>
+            <a:xfrm>
+              <a:off x="5597912" y="869796"/>
+              <a:ext cx="0" cy="4650059"/>
+            </a:xfrm>
+            <a:prstGeom prst="line">
+              <a:avLst/>
+            </a:prstGeom>
+            <a:ln w="19050">
+              <a:solidFill>
+                <a:srgbClr val="C00000"/>
+              </a:solidFill>
+              <a:prstDash val="dashDot"/>
+            </a:ln>
+          </p:spPr>
+          <p:style>
+            <a:lnRef idx="1">
+              <a:schemeClr val="accent1"/>
+            </a:lnRef>
+            <a:fillRef idx="0">
+              <a:schemeClr val="accent1"/>
+            </a:fillRef>
+            <a:effectRef idx="0">
+              <a:schemeClr val="accent1"/>
+            </a:effectRef>
+            <a:fontRef idx="minor">
+              <a:schemeClr val="tx1"/>
+            </a:fontRef>
+          </p:style>
+        </p:cxnSp>
+      </p:grpSp>
+    </p:spTree>
+    <p:extLst>
+      <p:ext uri="{BB962C8B-B14F-4D97-AF65-F5344CB8AC3E}">
+        <p14:creationId xmlns:p14="http://schemas.microsoft.com/office/powerpoint/2010/main" val="3982947026"/>
+      </p:ext>
+    </p:extLst>
+  </p:cSld>
+  <p:clrMapOvr>
+    <a:masterClrMapping/>
+  </p:clrMapOvr>
+</p:sld>
+</file>
+
+<file path=ppt/slides/slide4.xml><?xml version="1.0" encoding="utf-8"?>
 <p:sld xmlns:a="http://schemas.openxmlformats.org/drawingml/2006/main" xmlns:r="http://schemas.openxmlformats.org/officeDocument/2006/relationships" xmlns:p="http://schemas.openxmlformats.org/presentationml/2006/main">
   <p:cSld>
     <p:spTree>
@@ -13569,7 +15583,7 @@
 </p:sld>
 </file>
 
-<file path=ppt/slides/slide3.xml><?xml version="1.0" encoding="utf-8"?>
+<file path=ppt/slides/slide5.xml><?xml version="1.0" encoding="utf-8"?>
 <p:sld xmlns:a="http://schemas.openxmlformats.org/drawingml/2006/main" xmlns:r="http://schemas.openxmlformats.org/officeDocument/2006/relationships" xmlns:p="http://schemas.openxmlformats.org/presentationml/2006/main">
   <p:cSld>
     <p:spTree>
@@ -13871,7 +15885,7 @@
 </p:sld>
 </file>
 
-<file path=ppt/slides/slide4.xml><?xml version="1.0" encoding="utf-8"?>
+<file path=ppt/slides/slide6.xml><?xml version="1.0" encoding="utf-8"?>
 <p:sld xmlns:a="http://schemas.openxmlformats.org/drawingml/2006/main" xmlns:r="http://schemas.openxmlformats.org/officeDocument/2006/relationships" xmlns:p="http://schemas.openxmlformats.org/presentationml/2006/main">
   <p:cSld>
     <p:spTree>
@@ -21416,7 +23430,7 @@
 </p:sld>
 </file>
 
-<file path=ppt/slides/slide5.xml><?xml version="1.0" encoding="utf-8"?>
+<file path=ppt/slides/slide7.xml><?xml version="1.0" encoding="utf-8"?>
 <p:sld xmlns:a="http://schemas.openxmlformats.org/drawingml/2006/main" xmlns:r="http://schemas.openxmlformats.org/officeDocument/2006/relationships" xmlns:p="http://schemas.openxmlformats.org/presentationml/2006/main">
   <p:cSld>
     <p:spTree>
@@ -23830,7 +25844,7 @@
 </p:sld>
 </file>
 
-<file path=ppt/slides/slide6.xml><?xml version="1.0" encoding="utf-8"?>
+<file path=ppt/slides/slide8.xml><?xml version="1.0" encoding="utf-8"?>
 <p:sld xmlns:a="http://schemas.openxmlformats.org/drawingml/2006/main" xmlns:r="http://schemas.openxmlformats.org/officeDocument/2006/relationships" xmlns:p="http://schemas.openxmlformats.org/presentationml/2006/main">
   <p:cSld>
     <p:spTree>
@@ -23955,7 +25969,7 @@
 </p:sld>
 </file>
 
-<file path=ppt/slides/slide7.xml><?xml version="1.0" encoding="utf-8"?>
+<file path=ppt/slides/slide9.xml><?xml version="1.0" encoding="utf-8"?>
 <p:sld xmlns:a="http://schemas.openxmlformats.org/drawingml/2006/main" xmlns:r="http://schemas.openxmlformats.org/officeDocument/2006/relationships" xmlns:p="http://schemas.openxmlformats.org/presentationml/2006/main">
   <p:cSld>
     <p:spTree>
@@ -24196,396 +26210,6 @@
     <p:extLst>
       <p:ext uri="{BB962C8B-B14F-4D97-AF65-F5344CB8AC3E}">
         <p14:creationId xmlns:p14="http://schemas.microsoft.com/office/powerpoint/2010/main" val="3651071634"/>
-      </p:ext>
-    </p:extLst>
-  </p:cSld>
-  <p:clrMapOvr>
-    <a:masterClrMapping/>
-  </p:clrMapOvr>
-</p:sld>
-</file>
-
-<file path=ppt/slides/slide8.xml><?xml version="1.0" encoding="utf-8"?>
-<p:sld xmlns:a="http://schemas.openxmlformats.org/drawingml/2006/main" xmlns:r="http://schemas.openxmlformats.org/officeDocument/2006/relationships" xmlns:p="http://schemas.openxmlformats.org/presentationml/2006/main">
-  <p:cSld>
-    <p:spTree>
-      <p:nvGrpSpPr>
-        <p:cNvPr id="1" name=""/>
-        <p:cNvGrpSpPr/>
-        <p:nvPr/>
-      </p:nvGrpSpPr>
-      <p:grpSpPr>
-        <a:xfrm>
-          <a:off x="0" y="0"/>
-          <a:ext cx="0" cy="0"/>
-          <a:chOff x="0" y="0"/>
-          <a:chExt cx="0" cy="0"/>
-        </a:xfrm>
-      </p:grpSpPr>
-      <p:pic>
-        <p:nvPicPr>
-          <p:cNvPr id="5" name="Picture 4">
-            <a:extLst>
-              <a:ext uri="{FF2B5EF4-FFF2-40B4-BE49-F238E27FC236}">
-                <a16:creationId xmlns:a16="http://schemas.microsoft.com/office/drawing/2014/main" id="{EE1BC7DA-3408-F540-BE55-5BA7F9E2ACBF}"/>
-              </a:ext>
-            </a:extLst>
-          </p:cNvPr>
-          <p:cNvPicPr>
-            <a:picLocks noChangeAspect="1"/>
-          </p:cNvPicPr>
-          <p:nvPr/>
-        </p:nvPicPr>
-        <p:blipFill>
-          <a:blip r:embed="rId2"/>
-          <a:stretch>
-            <a:fillRect/>
-          </a:stretch>
-        </p:blipFill>
-        <p:spPr>
-          <a:xfrm>
-            <a:off x="6096000" y="2181621"/>
-            <a:ext cx="6096000" cy="2494756"/>
-          </a:xfrm>
-          <a:prstGeom prst="rect">
-            <a:avLst/>
-          </a:prstGeom>
-        </p:spPr>
-      </p:pic>
-      <p:pic>
-        <p:nvPicPr>
-          <p:cNvPr id="7" name="Picture 6">
-            <a:extLst>
-              <a:ext uri="{FF2B5EF4-FFF2-40B4-BE49-F238E27FC236}">
-                <a16:creationId xmlns:a16="http://schemas.microsoft.com/office/drawing/2014/main" id="{01FAD679-C194-974B-946D-436300660CDE}"/>
-              </a:ext>
-            </a:extLst>
-          </p:cNvPr>
-          <p:cNvPicPr>
-            <a:picLocks noChangeAspect="1"/>
-          </p:cNvPicPr>
-          <p:nvPr/>
-        </p:nvPicPr>
-        <p:blipFill>
-          <a:blip r:embed="rId3"/>
-          <a:stretch>
-            <a:fillRect/>
-          </a:stretch>
-        </p:blipFill>
-        <p:spPr>
-          <a:xfrm>
-            <a:off x="0" y="2171313"/>
-            <a:ext cx="6096000" cy="2515373"/>
-          </a:xfrm>
-          <a:prstGeom prst="rect">
-            <a:avLst/>
-          </a:prstGeom>
-        </p:spPr>
-      </p:pic>
-      <p:sp>
-        <p:nvSpPr>
-          <p:cNvPr id="8" name="TextBox 7">
-            <a:extLst>
-              <a:ext uri="{FF2B5EF4-FFF2-40B4-BE49-F238E27FC236}">
-                <a16:creationId xmlns:a16="http://schemas.microsoft.com/office/drawing/2014/main" id="{F40A952E-67FA-434B-B17F-87479D399993}"/>
-              </a:ext>
-            </a:extLst>
-          </p:cNvPr>
-          <p:cNvSpPr txBox="1"/>
-          <p:nvPr/>
-        </p:nvSpPr>
-        <p:spPr>
-          <a:xfrm>
-            <a:off x="8140360" y="4676377"/>
-            <a:ext cx="2007280" cy="369332"/>
-          </a:xfrm>
-          <a:prstGeom prst="rect">
-            <a:avLst/>
-          </a:prstGeom>
-          <a:noFill/>
-        </p:spPr>
-        <p:txBody>
-          <a:bodyPr wrap="none" rtlCol="0">
-            <a:spAutoFit/>
-          </a:bodyPr>
-          <a:lstStyle/>
-          <a:p>
-            <a:pPr algn="ctr"/>
-            <a:r>
-              <a:rPr lang="en-US" b="0" i="0" u="none" strike="noStrike" dirty="0">
-                <a:solidFill>
-                  <a:srgbClr val="333333"/>
-                </a:solidFill>
-                <a:effectLst/>
-                <a:latin typeface="Times New Roman" panose="02020603050405020304" pitchFamily="18" charset="0"/>
-                <a:cs typeface="Times New Roman" panose="02020603050405020304" pitchFamily="18" charset="0"/>
-              </a:rPr>
-              <a:t>BS Change (bs*=2)</a:t>
-            </a:r>
-            <a:endParaRPr lang="en-CN" dirty="0">
-              <a:latin typeface="Times New Roman" panose="02020603050405020304" pitchFamily="18" charset="0"/>
-              <a:cs typeface="Times New Roman" panose="02020603050405020304" pitchFamily="18" charset="0"/>
-            </a:endParaRPr>
-          </a:p>
-        </p:txBody>
-      </p:sp>
-      <p:sp>
-        <p:nvSpPr>
-          <p:cNvPr id="9" name="TextBox 8">
-            <a:extLst>
-              <a:ext uri="{FF2B5EF4-FFF2-40B4-BE49-F238E27FC236}">
-                <a16:creationId xmlns:a16="http://schemas.microsoft.com/office/drawing/2014/main" id="{DAE8755A-FA1F-B448-82C2-8B18378FC4CD}"/>
-              </a:ext>
-            </a:extLst>
-          </p:cNvPr>
-          <p:cNvSpPr txBox="1"/>
-          <p:nvPr/>
-        </p:nvSpPr>
-        <p:spPr>
-          <a:xfrm>
-            <a:off x="2070007" y="4676377"/>
-            <a:ext cx="1955985" cy="369332"/>
-          </a:xfrm>
-          <a:prstGeom prst="rect">
-            <a:avLst/>
-          </a:prstGeom>
-          <a:noFill/>
-        </p:spPr>
-        <p:txBody>
-          <a:bodyPr wrap="none" rtlCol="0">
-            <a:spAutoFit/>
-          </a:bodyPr>
-          <a:lstStyle/>
-          <a:p>
-            <a:pPr algn="ctr"/>
-            <a:r>
-              <a:rPr lang="en-US" b="0" i="0" u="none" strike="noStrike" dirty="0">
-                <a:solidFill>
-                  <a:srgbClr val="333333"/>
-                </a:solidFill>
-                <a:effectLst/>
-                <a:latin typeface="Times New Roman" panose="02020603050405020304" pitchFamily="18" charset="0"/>
-                <a:cs typeface="Times New Roman" panose="02020603050405020304" pitchFamily="18" charset="0"/>
-              </a:rPr>
-              <a:t>BS Change (bs</a:t>
-            </a:r>
-            <a:r>
-              <a:rPr lang="en-US" altLang="zh-CN" b="0" i="0" u="none" strike="noStrike" dirty="0">
-                <a:solidFill>
-                  <a:srgbClr val="333333"/>
-                </a:solidFill>
-                <a:effectLst/>
-                <a:latin typeface="Times New Roman" panose="02020603050405020304" pitchFamily="18" charset="0"/>
-                <a:cs typeface="Times New Roman" panose="02020603050405020304" pitchFamily="18" charset="0"/>
-              </a:rPr>
-              <a:t>/</a:t>
-            </a:r>
-            <a:r>
-              <a:rPr lang="en-US" b="0" i="0" u="none" strike="noStrike" dirty="0">
-                <a:solidFill>
-                  <a:srgbClr val="333333"/>
-                </a:solidFill>
-                <a:effectLst/>
-                <a:latin typeface="Times New Roman" panose="02020603050405020304" pitchFamily="18" charset="0"/>
-                <a:cs typeface="Times New Roman" panose="02020603050405020304" pitchFamily="18" charset="0"/>
-              </a:rPr>
-              <a:t>=2)</a:t>
-            </a:r>
-            <a:endParaRPr lang="en-CN" dirty="0">
-              <a:latin typeface="Times New Roman" panose="02020603050405020304" pitchFamily="18" charset="0"/>
-              <a:cs typeface="Times New Roman" panose="02020603050405020304" pitchFamily="18" charset="0"/>
-            </a:endParaRPr>
-          </a:p>
-        </p:txBody>
-      </p:sp>
-    </p:spTree>
-    <p:extLst>
-      <p:ext uri="{BB962C8B-B14F-4D97-AF65-F5344CB8AC3E}">
-        <p14:creationId xmlns:p14="http://schemas.microsoft.com/office/powerpoint/2010/main" val="423340629"/>
-      </p:ext>
-    </p:extLst>
-  </p:cSld>
-  <p:clrMapOvr>
-    <a:masterClrMapping/>
-  </p:clrMapOvr>
-</p:sld>
-</file>
-
-<file path=ppt/slides/slide9.xml><?xml version="1.0" encoding="utf-8"?>
-<p:sld xmlns:a="http://schemas.openxmlformats.org/drawingml/2006/main" xmlns:r="http://schemas.openxmlformats.org/officeDocument/2006/relationships" xmlns:p="http://schemas.openxmlformats.org/presentationml/2006/main">
-  <p:cSld>
-    <p:spTree>
-      <p:nvGrpSpPr>
-        <p:cNvPr id="1" name=""/>
-        <p:cNvGrpSpPr/>
-        <p:nvPr/>
-      </p:nvGrpSpPr>
-      <p:grpSpPr>
-        <a:xfrm>
-          <a:off x="0" y="0"/>
-          <a:ext cx="0" cy="0"/>
-          <a:chOff x="0" y="0"/>
-          <a:chExt cx="0" cy="0"/>
-        </a:xfrm>
-      </p:grpSpPr>
-      <p:pic>
-        <p:nvPicPr>
-          <p:cNvPr id="7" name="Picture 6">
-            <a:extLst>
-              <a:ext uri="{FF2B5EF4-FFF2-40B4-BE49-F238E27FC236}">
-                <a16:creationId xmlns:a16="http://schemas.microsoft.com/office/drawing/2014/main" id="{5B034E5C-B39E-4D48-BDC7-23F56B6A0F78}"/>
-              </a:ext>
-            </a:extLst>
-          </p:cNvPr>
-          <p:cNvPicPr>
-            <a:picLocks noChangeAspect="1"/>
-          </p:cNvPicPr>
-          <p:nvPr/>
-        </p:nvPicPr>
-        <p:blipFill>
-          <a:blip r:embed="rId2"/>
-          <a:stretch>
-            <a:fillRect/>
-          </a:stretch>
-        </p:blipFill>
-        <p:spPr>
-          <a:xfrm>
-            <a:off x="0" y="2181622"/>
-            <a:ext cx="6095999" cy="2494755"/>
-          </a:xfrm>
-          <a:prstGeom prst="rect">
-            <a:avLst/>
-          </a:prstGeom>
-        </p:spPr>
-      </p:pic>
-      <p:pic>
-        <p:nvPicPr>
-          <p:cNvPr id="9" name="Picture 8">
-            <a:extLst>
-              <a:ext uri="{FF2B5EF4-FFF2-40B4-BE49-F238E27FC236}">
-                <a16:creationId xmlns:a16="http://schemas.microsoft.com/office/drawing/2014/main" id="{E8E65419-4D5D-4A4F-A140-33EDDAC866B8}"/>
-              </a:ext>
-            </a:extLst>
-          </p:cNvPr>
-          <p:cNvPicPr>
-            <a:picLocks noChangeAspect="1"/>
-          </p:cNvPicPr>
-          <p:nvPr/>
-        </p:nvPicPr>
-        <p:blipFill>
-          <a:blip r:embed="rId3"/>
-          <a:stretch>
-            <a:fillRect/>
-          </a:stretch>
-        </p:blipFill>
-        <p:spPr>
-          <a:xfrm>
-            <a:off x="6095999" y="2181622"/>
-            <a:ext cx="6096000" cy="2494755"/>
-          </a:xfrm>
-          <a:prstGeom prst="rect">
-            <a:avLst/>
-          </a:prstGeom>
-        </p:spPr>
-      </p:pic>
-      <p:sp>
-        <p:nvSpPr>
-          <p:cNvPr id="10" name="TextBox 9">
-            <a:extLst>
-              <a:ext uri="{FF2B5EF4-FFF2-40B4-BE49-F238E27FC236}">
-                <a16:creationId xmlns:a16="http://schemas.microsoft.com/office/drawing/2014/main" id="{F9DB54DF-9A63-214D-96D9-A605D3D22CC2}"/>
-              </a:ext>
-            </a:extLst>
-          </p:cNvPr>
-          <p:cNvSpPr txBox="1"/>
-          <p:nvPr/>
-        </p:nvSpPr>
-        <p:spPr>
-          <a:xfrm>
-            <a:off x="7907121" y="4676377"/>
-            <a:ext cx="2473755" cy="369332"/>
-          </a:xfrm>
-          <a:prstGeom prst="rect">
-            <a:avLst/>
-          </a:prstGeom>
-          <a:noFill/>
-        </p:spPr>
-        <p:txBody>
-          <a:bodyPr wrap="none" rtlCol="0">
-            <a:spAutoFit/>
-          </a:bodyPr>
-          <a:lstStyle/>
-          <a:p>
-            <a:pPr algn="ctr"/>
-            <a:r>
-              <a:rPr lang="en-US" b="0" i="0" u="none" strike="noStrike" dirty="0">
-                <a:solidFill>
-                  <a:srgbClr val="333333"/>
-                </a:solidFill>
-                <a:effectLst/>
-                <a:latin typeface="Times New Roman" panose="02020603050405020304" pitchFamily="18" charset="0"/>
-                <a:cs typeface="Times New Roman" panose="02020603050405020304" pitchFamily="18" charset="0"/>
-              </a:rPr>
-              <a:t>Conv Change (both 5x5)</a:t>
-            </a:r>
-            <a:endParaRPr lang="en-CN" dirty="0">
-              <a:latin typeface="Times New Roman" panose="02020603050405020304" pitchFamily="18" charset="0"/>
-              <a:cs typeface="Times New Roman" panose="02020603050405020304" pitchFamily="18" charset="0"/>
-            </a:endParaRPr>
-          </a:p>
-        </p:txBody>
-      </p:sp>
-      <p:sp>
-        <p:nvSpPr>
-          <p:cNvPr id="11" name="TextBox 10">
-            <a:extLst>
-              <a:ext uri="{FF2B5EF4-FFF2-40B4-BE49-F238E27FC236}">
-                <a16:creationId xmlns:a16="http://schemas.microsoft.com/office/drawing/2014/main" id="{8C4A2E3D-935B-F345-A612-645B7F1F31E7}"/>
-              </a:ext>
-            </a:extLst>
-          </p:cNvPr>
-          <p:cNvSpPr txBox="1"/>
-          <p:nvPr/>
-        </p:nvSpPr>
-        <p:spPr>
-          <a:xfrm>
-            <a:off x="1811123" y="4676377"/>
-            <a:ext cx="2473754" cy="369332"/>
-          </a:xfrm>
-          <a:prstGeom prst="rect">
-            <a:avLst/>
-          </a:prstGeom>
-          <a:noFill/>
-        </p:spPr>
-        <p:txBody>
-          <a:bodyPr wrap="none" rtlCol="0">
-            <a:spAutoFit/>
-          </a:bodyPr>
-          <a:lstStyle/>
-          <a:p>
-            <a:pPr algn="ctr"/>
-            <a:r>
-              <a:rPr lang="en-US" b="0" i="0" u="none" strike="noStrike" dirty="0">
-                <a:solidFill>
-                  <a:srgbClr val="333333"/>
-                </a:solidFill>
-                <a:effectLst/>
-                <a:latin typeface="Times New Roman" panose="02020603050405020304" pitchFamily="18" charset="0"/>
-                <a:cs typeface="Times New Roman" panose="02020603050405020304" pitchFamily="18" charset="0"/>
-              </a:rPr>
-              <a:t>Conv Change (both 3x3)</a:t>
-            </a:r>
-            <a:endParaRPr lang="en-CN" dirty="0">
-              <a:latin typeface="Times New Roman" panose="02020603050405020304" pitchFamily="18" charset="0"/>
-              <a:cs typeface="Times New Roman" panose="02020603050405020304" pitchFamily="18" charset="0"/>
-            </a:endParaRPr>
-          </a:p>
-        </p:txBody>
-      </p:sp>
-    </p:spTree>
-    <p:extLst>
-      <p:ext uri="{BB962C8B-B14F-4D97-AF65-F5344CB8AC3E}">
-        <p14:creationId xmlns:p14="http://schemas.microsoft.com/office/powerpoint/2010/main" val="3334265441"/>
       </p:ext>
     </p:extLst>
   </p:cSld>

</xml_diff>